<commit_message>
Completed hypothetical business scenario
</commit_message>
<xml_diff>
--- a/synapse-sqlviews-integrationtesting/docs/Synapse-Presentation1.pptx
+++ b/synapse-sqlviews-integrationtesting/docs/Synapse-Presentation1.pptx
@@ -7,6 +7,8 @@
   <p:sldIdLst>
     <p:sldId id="256" r:id="rId2"/>
     <p:sldId id="257" r:id="rId3"/>
+    <p:sldId id="258" r:id="rId4"/>
+    <p:sldId id="259" r:id="rId5"/>
   </p:sldIdLst>
   <p:sldSz cx="12192000" cy="6858000"/>
   <p:notesSz cx="6858000" cy="9144000"/>
@@ -105,6 +107,11 @@
       </a:defRPr>
     </a:lvl9pPr>
   </p:defaultTextStyle>
+  <p:extLst>
+    <p:ext uri="{EFAFB233-063F-42B5-8137-9DF3F51BA10A}">
+      <p15:sldGuideLst xmlns:p15="http://schemas.microsoft.com/office/powerpoint/2012/main"/>
+    </p:ext>
+  </p:extLst>
 </p:presentation>
 </file>
 
@@ -257,7 +264,7 @@
           <a:p>
             <a:fld id="{FC05764E-BF05-4ADF-9C0D-E7E7BE4B37C6}" type="datetimeFigureOut">
               <a:rPr lang="en-GB" smtClean="0"/>
-              <a:t>17/07/2022</a:t>
+              <a:t>18/07/2022</a:t>
             </a:fld>
             <a:endParaRPr lang="en-GB"/>
           </a:p>
@@ -457,7 +464,7 @@
           <a:p>
             <a:fld id="{FC05764E-BF05-4ADF-9C0D-E7E7BE4B37C6}" type="datetimeFigureOut">
               <a:rPr lang="en-GB" smtClean="0"/>
-              <a:t>17/07/2022</a:t>
+              <a:t>18/07/2022</a:t>
             </a:fld>
             <a:endParaRPr lang="en-GB"/>
           </a:p>
@@ -667,7 +674,7 @@
           <a:p>
             <a:fld id="{FC05764E-BF05-4ADF-9C0D-E7E7BE4B37C6}" type="datetimeFigureOut">
               <a:rPr lang="en-GB" smtClean="0"/>
-              <a:t>17/07/2022</a:t>
+              <a:t>18/07/2022</a:t>
             </a:fld>
             <a:endParaRPr lang="en-GB"/>
           </a:p>
@@ -867,7 +874,7 @@
           <a:p>
             <a:fld id="{FC05764E-BF05-4ADF-9C0D-E7E7BE4B37C6}" type="datetimeFigureOut">
               <a:rPr lang="en-GB" smtClean="0"/>
-              <a:t>17/07/2022</a:t>
+              <a:t>18/07/2022</a:t>
             </a:fld>
             <a:endParaRPr lang="en-GB"/>
           </a:p>
@@ -1143,7 +1150,7 @@
           <a:p>
             <a:fld id="{FC05764E-BF05-4ADF-9C0D-E7E7BE4B37C6}" type="datetimeFigureOut">
               <a:rPr lang="en-GB" smtClean="0"/>
-              <a:t>17/07/2022</a:t>
+              <a:t>18/07/2022</a:t>
             </a:fld>
             <a:endParaRPr lang="en-GB"/>
           </a:p>
@@ -1411,7 +1418,7 @@
           <a:p>
             <a:fld id="{FC05764E-BF05-4ADF-9C0D-E7E7BE4B37C6}" type="datetimeFigureOut">
               <a:rPr lang="en-GB" smtClean="0"/>
-              <a:t>17/07/2022</a:t>
+              <a:t>18/07/2022</a:t>
             </a:fld>
             <a:endParaRPr lang="en-GB"/>
           </a:p>
@@ -1826,7 +1833,7 @@
           <a:p>
             <a:fld id="{FC05764E-BF05-4ADF-9C0D-E7E7BE4B37C6}" type="datetimeFigureOut">
               <a:rPr lang="en-GB" smtClean="0"/>
-              <a:t>17/07/2022</a:t>
+              <a:t>18/07/2022</a:t>
             </a:fld>
             <a:endParaRPr lang="en-GB"/>
           </a:p>
@@ -1968,7 +1975,7 @@
           <a:p>
             <a:fld id="{FC05764E-BF05-4ADF-9C0D-E7E7BE4B37C6}" type="datetimeFigureOut">
               <a:rPr lang="en-GB" smtClean="0"/>
-              <a:t>17/07/2022</a:t>
+              <a:t>18/07/2022</a:t>
             </a:fld>
             <a:endParaRPr lang="en-GB"/>
           </a:p>
@@ -2081,7 +2088,7 @@
           <a:p>
             <a:fld id="{FC05764E-BF05-4ADF-9C0D-E7E7BE4B37C6}" type="datetimeFigureOut">
               <a:rPr lang="en-GB" smtClean="0"/>
-              <a:t>17/07/2022</a:t>
+              <a:t>18/07/2022</a:t>
             </a:fld>
             <a:endParaRPr lang="en-GB"/>
           </a:p>
@@ -2394,7 +2401,7 @@
           <a:p>
             <a:fld id="{FC05764E-BF05-4ADF-9C0D-E7E7BE4B37C6}" type="datetimeFigureOut">
               <a:rPr lang="en-GB" smtClean="0"/>
-              <a:t>17/07/2022</a:t>
+              <a:t>18/07/2022</a:t>
             </a:fld>
             <a:endParaRPr lang="en-GB"/>
           </a:p>
@@ -2683,7 +2690,7 @@
           <a:p>
             <a:fld id="{FC05764E-BF05-4ADF-9C0D-E7E7BE4B37C6}" type="datetimeFigureOut">
               <a:rPr lang="en-GB" smtClean="0"/>
-              <a:t>17/07/2022</a:t>
+              <a:t>18/07/2022</a:t>
             </a:fld>
             <a:endParaRPr lang="en-GB"/>
           </a:p>
@@ -2926,7 +2933,7 @@
           <a:p>
             <a:fld id="{FC05764E-BF05-4ADF-9C0D-E7E7BE4B37C6}" type="datetimeFigureOut">
               <a:rPr lang="en-GB" smtClean="0"/>
-              <a:t>17/07/2022</a:t>
+              <a:t>18/07/2022</a:t>
             </a:fld>
             <a:endParaRPr lang="en-GB"/>
           </a:p>
@@ -3622,6 +3629,1419 @@
 </p:sld>
 </file>
 
+<file path=ppt/slides/slide3.xml><?xml version="1.0" encoding="utf-8"?>
+<p:sld xmlns:a="http://schemas.openxmlformats.org/drawingml/2006/main" xmlns:r="http://schemas.openxmlformats.org/officeDocument/2006/relationships" xmlns:p="http://schemas.openxmlformats.org/presentationml/2006/main">
+  <p:cSld>
+    <p:spTree>
+      <p:nvGrpSpPr>
+        <p:cNvPr id="1" name=""/>
+        <p:cNvGrpSpPr/>
+        <p:nvPr/>
+      </p:nvGrpSpPr>
+      <p:grpSpPr>
+        <a:xfrm>
+          <a:off x="0" y="0"/>
+          <a:ext cx="0" cy="0"/>
+          <a:chOff x="0" y="0"/>
+          <a:chExt cx="0" cy="0"/>
+        </a:xfrm>
+      </p:grpSpPr>
+      <p:sp>
+        <p:nvSpPr>
+          <p:cNvPr id="3" name="Rectangle: Rounded Corners 2">
+            <a:extLst>
+              <a:ext uri="{FF2B5EF4-FFF2-40B4-BE49-F238E27FC236}">
+                <a16:creationId xmlns:a16="http://schemas.microsoft.com/office/drawing/2014/main" id="{4F997B8E-00C0-0489-A7B2-7514C49F0064}"/>
+              </a:ext>
+            </a:extLst>
+          </p:cNvPr>
+          <p:cNvSpPr/>
+          <p:nvPr/>
+        </p:nvSpPr>
+        <p:spPr>
+          <a:xfrm>
+            <a:off x="3919491" y="3031727"/>
+            <a:ext cx="3986074" cy="896645"/>
+          </a:xfrm>
+          <a:prstGeom prst="roundRect">
+            <a:avLst/>
+          </a:prstGeom>
+        </p:spPr>
+        <p:style>
+          <a:lnRef idx="2">
+            <a:schemeClr val="accent1">
+              <a:shade val="50000"/>
+            </a:schemeClr>
+          </a:lnRef>
+          <a:fillRef idx="1">
+            <a:schemeClr val="accent1"/>
+          </a:fillRef>
+          <a:effectRef idx="0">
+            <a:schemeClr val="accent1"/>
+          </a:effectRef>
+          <a:fontRef idx="minor">
+            <a:schemeClr val="lt1"/>
+          </a:fontRef>
+        </p:style>
+        <p:txBody>
+          <a:bodyPr rtlCol="0" anchor="ctr"/>
+          <a:lstStyle/>
+          <a:p>
+            <a:pPr algn="ctr"/>
+            <a:r>
+              <a:rPr lang="en-GB" sz="3600" dirty="0"/>
+              <a:t>Contoso</a:t>
+            </a:r>
+          </a:p>
+        </p:txBody>
+      </p:sp>
+      <p:sp>
+        <p:nvSpPr>
+          <p:cNvPr id="4" name="Rectangle: Rounded Corners 3">
+            <a:extLst>
+              <a:ext uri="{FF2B5EF4-FFF2-40B4-BE49-F238E27FC236}">
+                <a16:creationId xmlns:a16="http://schemas.microsoft.com/office/drawing/2014/main" id="{3923E5EE-405C-8069-F7F9-F74474C6F670}"/>
+              </a:ext>
+            </a:extLst>
+          </p:cNvPr>
+          <p:cNvSpPr/>
+          <p:nvPr/>
+        </p:nvSpPr>
+        <p:spPr>
+          <a:xfrm>
+            <a:off x="942513" y="5166063"/>
+            <a:ext cx="2555289" cy="896645"/>
+          </a:xfrm>
+          <a:prstGeom prst="roundRect">
+            <a:avLst/>
+          </a:prstGeom>
+        </p:spPr>
+        <p:style>
+          <a:lnRef idx="2">
+            <a:schemeClr val="accent4">
+              <a:shade val="50000"/>
+            </a:schemeClr>
+          </a:lnRef>
+          <a:fillRef idx="1">
+            <a:schemeClr val="accent4"/>
+          </a:fillRef>
+          <a:effectRef idx="0">
+            <a:schemeClr val="accent4"/>
+          </a:effectRef>
+          <a:fontRef idx="minor">
+            <a:schemeClr val="lt1"/>
+          </a:fontRef>
+        </p:style>
+        <p:txBody>
+          <a:bodyPr rtlCol="0" anchor="ctr"/>
+          <a:lstStyle/>
+          <a:p>
+            <a:pPr algn="ctr"/>
+            <a:r>
+              <a:rPr lang="en-GB" sz="3600" dirty="0">
+                <a:ln w="0"/>
+                <a:solidFill>
+                  <a:schemeClr val="tx1"/>
+                </a:solidFill>
+                <a:effectLst>
+                  <a:outerShdw blurRad="38100" dist="19050" dir="2700000" algn="tl" rotWithShape="0">
+                    <a:schemeClr val="dk1">
+                      <a:alpha val="40000"/>
+                    </a:schemeClr>
+                  </a:outerShdw>
+                </a:effectLst>
+              </a:rPr>
+              <a:t>Stocks CSV</a:t>
+            </a:r>
+          </a:p>
+        </p:txBody>
+      </p:sp>
+      <p:sp>
+        <p:nvSpPr>
+          <p:cNvPr id="5" name="Rectangle: Rounded Corners 4">
+            <a:extLst>
+              <a:ext uri="{FF2B5EF4-FFF2-40B4-BE49-F238E27FC236}">
+                <a16:creationId xmlns:a16="http://schemas.microsoft.com/office/drawing/2014/main" id="{B120995E-5CE9-ADA5-3AE8-9C521DDCBAAB}"/>
+              </a:ext>
+            </a:extLst>
+          </p:cNvPr>
+          <p:cNvSpPr/>
+          <p:nvPr/>
+        </p:nvSpPr>
+        <p:spPr>
+          <a:xfrm>
+            <a:off x="4406284" y="5166062"/>
+            <a:ext cx="2555289" cy="896645"/>
+          </a:xfrm>
+          <a:prstGeom prst="roundRect">
+            <a:avLst/>
+          </a:prstGeom>
+        </p:spPr>
+        <p:style>
+          <a:lnRef idx="2">
+            <a:schemeClr val="accent4">
+              <a:shade val="50000"/>
+            </a:schemeClr>
+          </a:lnRef>
+          <a:fillRef idx="1">
+            <a:schemeClr val="accent4"/>
+          </a:fillRef>
+          <a:effectRef idx="0">
+            <a:schemeClr val="accent4"/>
+          </a:effectRef>
+          <a:fontRef idx="minor">
+            <a:schemeClr val="lt1"/>
+          </a:fontRef>
+        </p:style>
+        <p:txBody>
+          <a:bodyPr rtlCol="0" anchor="ctr"/>
+          <a:lstStyle/>
+          <a:p>
+            <a:pPr algn="ctr"/>
+            <a:r>
+              <a:rPr lang="en-GB" sz="3600" dirty="0">
+                <a:ln w="0"/>
+                <a:solidFill>
+                  <a:schemeClr val="tx1"/>
+                </a:solidFill>
+                <a:effectLst>
+                  <a:outerShdw blurRad="38100" dist="19050" dir="2700000" algn="tl" rotWithShape="0">
+                    <a:schemeClr val="dk1">
+                      <a:alpha val="40000"/>
+                    </a:schemeClr>
+                  </a:outerShdw>
+                </a:effectLst>
+              </a:rPr>
+              <a:t>Energy prices CSV</a:t>
+            </a:r>
+          </a:p>
+        </p:txBody>
+      </p:sp>
+      <p:sp>
+        <p:nvSpPr>
+          <p:cNvPr id="6" name="Rectangle: Rounded Corners 5">
+            <a:extLst>
+              <a:ext uri="{FF2B5EF4-FFF2-40B4-BE49-F238E27FC236}">
+                <a16:creationId xmlns:a16="http://schemas.microsoft.com/office/drawing/2014/main" id="{2B37EFDE-8558-5971-C863-6E27708E0E90}"/>
+              </a:ext>
+            </a:extLst>
+          </p:cNvPr>
+          <p:cNvSpPr/>
+          <p:nvPr/>
+        </p:nvSpPr>
+        <p:spPr>
+          <a:xfrm>
+            <a:off x="8001740" y="5166062"/>
+            <a:ext cx="3247747" cy="896645"/>
+          </a:xfrm>
+          <a:prstGeom prst="roundRect">
+            <a:avLst/>
+          </a:prstGeom>
+        </p:spPr>
+        <p:style>
+          <a:lnRef idx="2">
+            <a:schemeClr val="accent4">
+              <a:shade val="50000"/>
+            </a:schemeClr>
+          </a:lnRef>
+          <a:fillRef idx="1">
+            <a:schemeClr val="accent4"/>
+          </a:fillRef>
+          <a:effectRef idx="0">
+            <a:schemeClr val="accent4"/>
+          </a:effectRef>
+          <a:fontRef idx="minor">
+            <a:schemeClr val="lt1"/>
+          </a:fontRef>
+        </p:style>
+        <p:txBody>
+          <a:bodyPr rtlCol="0" anchor="ctr"/>
+          <a:lstStyle/>
+          <a:p>
+            <a:pPr algn="ctr"/>
+            <a:r>
+              <a:rPr lang="en-GB" sz="3600" dirty="0">
+                <a:ln w="0"/>
+                <a:solidFill>
+                  <a:schemeClr val="tx1"/>
+                </a:solidFill>
+                <a:effectLst>
+                  <a:outerShdw blurRad="38100" dist="19050" dir="2700000" algn="tl" rotWithShape="0">
+                    <a:schemeClr val="dk1">
+                      <a:alpha val="40000"/>
+                    </a:schemeClr>
+                  </a:outerShdw>
+                </a:effectLst>
+              </a:rPr>
+              <a:t>Commodities CSV</a:t>
+            </a:r>
+          </a:p>
+        </p:txBody>
+      </p:sp>
+      <p:sp>
+        <p:nvSpPr>
+          <p:cNvPr id="7" name="Arrow: Up 6">
+            <a:extLst>
+              <a:ext uri="{FF2B5EF4-FFF2-40B4-BE49-F238E27FC236}">
+                <a16:creationId xmlns:a16="http://schemas.microsoft.com/office/drawing/2014/main" id="{CC7B2E39-EFAD-6363-DF67-577B9B2A186E}"/>
+              </a:ext>
+            </a:extLst>
+          </p:cNvPr>
+          <p:cNvSpPr/>
+          <p:nvPr/>
+        </p:nvSpPr>
+        <p:spPr>
+          <a:xfrm>
+            <a:off x="5397623" y="4048217"/>
+            <a:ext cx="1029810" cy="816746"/>
+          </a:xfrm>
+          <a:prstGeom prst="upArrow">
+            <a:avLst/>
+          </a:prstGeom>
+        </p:spPr>
+        <p:style>
+          <a:lnRef idx="2">
+            <a:schemeClr val="accent1">
+              <a:shade val="50000"/>
+            </a:schemeClr>
+          </a:lnRef>
+          <a:fillRef idx="1">
+            <a:schemeClr val="accent1"/>
+          </a:fillRef>
+          <a:effectRef idx="0">
+            <a:schemeClr val="accent1"/>
+          </a:effectRef>
+          <a:fontRef idx="minor">
+            <a:schemeClr val="lt1"/>
+          </a:fontRef>
+        </p:style>
+        <p:txBody>
+          <a:bodyPr rtlCol="0" anchor="ctr"/>
+          <a:lstStyle/>
+          <a:p>
+            <a:pPr algn="ctr"/>
+            <a:endParaRPr lang="en-GB"/>
+          </a:p>
+        </p:txBody>
+      </p:sp>
+      <p:pic>
+        <p:nvPicPr>
+          <p:cNvPr id="9" name="Picture 8">
+            <a:extLst>
+              <a:ext uri="{FF2B5EF4-FFF2-40B4-BE49-F238E27FC236}">
+                <a16:creationId xmlns:a16="http://schemas.microsoft.com/office/drawing/2014/main" id="{AF21B9C5-C623-C5A0-6E92-D25C191CB892}"/>
+              </a:ext>
+            </a:extLst>
+          </p:cNvPr>
+          <p:cNvPicPr>
+            <a:picLocks noChangeAspect="1"/>
+          </p:cNvPicPr>
+          <p:nvPr/>
+        </p:nvPicPr>
+        <p:blipFill>
+          <a:blip r:embed="rId2">
+            <a:extLst>
+              <a:ext uri="{28A0092B-C50C-407E-A947-70E740481C1C}">
+                <a14:useLocalDpi xmlns:a14="http://schemas.microsoft.com/office/drawing/2010/main" val="0"/>
+              </a:ext>
+              <a:ext uri="{837473B0-CC2E-450A-ABE3-18F120FF3D39}">
+                <a1611:picAttrSrcUrl xmlns:a1611="http://schemas.microsoft.com/office/drawing/2016/11/main" r:id="rId3"/>
+              </a:ext>
+            </a:extLst>
+          </a:blip>
+          <a:stretch>
+            <a:fillRect/>
+          </a:stretch>
+        </p:blipFill>
+        <p:spPr>
+          <a:xfrm>
+            <a:off x="5397623" y="5181"/>
+            <a:ext cx="877559" cy="1350091"/>
+          </a:xfrm>
+          <a:prstGeom prst="rect">
+            <a:avLst/>
+          </a:prstGeom>
+        </p:spPr>
+      </p:pic>
+      <p:sp>
+        <p:nvSpPr>
+          <p:cNvPr id="10" name="TextBox 9">
+            <a:extLst>
+              <a:ext uri="{FF2B5EF4-FFF2-40B4-BE49-F238E27FC236}">
+                <a16:creationId xmlns:a16="http://schemas.microsoft.com/office/drawing/2014/main" id="{14717D94-6ED8-0E0A-3107-FA99666EB208}"/>
+              </a:ext>
+            </a:extLst>
+          </p:cNvPr>
+          <p:cNvSpPr txBox="1"/>
+          <p:nvPr/>
+        </p:nvSpPr>
+        <p:spPr>
+          <a:xfrm>
+            <a:off x="5473748" y="1525968"/>
+            <a:ext cx="877559" cy="369332"/>
+          </a:xfrm>
+          <a:prstGeom prst="rect">
+            <a:avLst/>
+          </a:prstGeom>
+          <a:noFill/>
+        </p:spPr>
+        <p:txBody>
+          <a:bodyPr wrap="square" rtlCol="0">
+            <a:spAutoFit/>
+          </a:bodyPr>
+          <a:lstStyle/>
+          <a:p>
+            <a:r>
+              <a:rPr lang="en-GB" dirty="0"/>
+              <a:t>Analyst</a:t>
+            </a:r>
+          </a:p>
+        </p:txBody>
+      </p:sp>
+      <p:sp>
+        <p:nvSpPr>
+          <p:cNvPr id="12" name="Rectangle: Rounded Corners 11">
+            <a:extLst>
+              <a:ext uri="{FF2B5EF4-FFF2-40B4-BE49-F238E27FC236}">
+                <a16:creationId xmlns:a16="http://schemas.microsoft.com/office/drawing/2014/main" id="{3F2DE30F-1188-A505-E544-76C80F2FB7CF}"/>
+              </a:ext>
+            </a:extLst>
+          </p:cNvPr>
+          <p:cNvSpPr/>
+          <p:nvPr/>
+        </p:nvSpPr>
+        <p:spPr>
+          <a:xfrm>
+            <a:off x="553375" y="231903"/>
+            <a:ext cx="2555289" cy="896645"/>
+          </a:xfrm>
+          <a:prstGeom prst="roundRect">
+            <a:avLst/>
+          </a:prstGeom>
+        </p:spPr>
+        <p:style>
+          <a:lnRef idx="1">
+            <a:schemeClr val="accent4"/>
+          </a:lnRef>
+          <a:fillRef idx="2">
+            <a:schemeClr val="accent4"/>
+          </a:fillRef>
+          <a:effectRef idx="1">
+            <a:schemeClr val="accent4"/>
+          </a:effectRef>
+          <a:fontRef idx="minor">
+            <a:schemeClr val="dk1"/>
+          </a:fontRef>
+        </p:style>
+        <p:txBody>
+          <a:bodyPr rtlCol="0" anchor="ctr"/>
+          <a:lstStyle/>
+          <a:p>
+            <a:pPr algn="ctr"/>
+            <a:r>
+              <a:rPr lang="en-GB" sz="3600" dirty="0">
+                <a:ln w="0"/>
+                <a:solidFill>
+                  <a:schemeClr val="tx1"/>
+                </a:solidFill>
+                <a:effectLst>
+                  <a:outerShdw blurRad="38100" dist="19050" dir="2700000" algn="tl" rotWithShape="0">
+                    <a:schemeClr val="dk1">
+                      <a:alpha val="40000"/>
+                    </a:schemeClr>
+                  </a:outerShdw>
+                </a:effectLst>
+              </a:rPr>
+              <a:t>Power BI</a:t>
+            </a:r>
+          </a:p>
+        </p:txBody>
+      </p:sp>
+      <p:sp>
+        <p:nvSpPr>
+          <p:cNvPr id="13" name="Rectangle: Rounded Corners 12">
+            <a:extLst>
+              <a:ext uri="{FF2B5EF4-FFF2-40B4-BE49-F238E27FC236}">
+                <a16:creationId xmlns:a16="http://schemas.microsoft.com/office/drawing/2014/main" id="{B0A5788D-8713-CD8D-FA26-8BD9E7D295CD}"/>
+              </a:ext>
+            </a:extLst>
+          </p:cNvPr>
+          <p:cNvSpPr/>
+          <p:nvPr/>
+        </p:nvSpPr>
+        <p:spPr>
+          <a:xfrm>
+            <a:off x="7790155" y="215231"/>
+            <a:ext cx="3351320" cy="896645"/>
+          </a:xfrm>
+          <a:prstGeom prst="roundRect">
+            <a:avLst/>
+          </a:prstGeom>
+        </p:spPr>
+        <p:style>
+          <a:lnRef idx="1">
+            <a:schemeClr val="accent4"/>
+          </a:lnRef>
+          <a:fillRef idx="2">
+            <a:schemeClr val="accent4"/>
+          </a:fillRef>
+          <a:effectRef idx="1">
+            <a:schemeClr val="accent4"/>
+          </a:effectRef>
+          <a:fontRef idx="minor">
+            <a:schemeClr val="dk1"/>
+          </a:fontRef>
+        </p:style>
+        <p:txBody>
+          <a:bodyPr rtlCol="0" anchor="ctr"/>
+          <a:lstStyle/>
+          <a:p>
+            <a:pPr algn="ctr"/>
+            <a:r>
+              <a:rPr lang="en-GB" sz="3600" dirty="0">
+                <a:ln w="0"/>
+                <a:solidFill>
+                  <a:schemeClr val="tx1"/>
+                </a:solidFill>
+                <a:effectLst>
+                  <a:outerShdw blurRad="38100" dist="19050" dir="2700000" algn="tl" rotWithShape="0">
+                    <a:schemeClr val="dk1">
+                      <a:alpha val="40000"/>
+                    </a:schemeClr>
+                  </a:outerShdw>
+                </a:effectLst>
+              </a:rPr>
+              <a:t>Python/Pandas</a:t>
+            </a:r>
+          </a:p>
+        </p:txBody>
+      </p:sp>
+      <p:sp>
+        <p:nvSpPr>
+          <p:cNvPr id="14" name="Arrow: Up 13">
+            <a:extLst>
+              <a:ext uri="{FF2B5EF4-FFF2-40B4-BE49-F238E27FC236}">
+                <a16:creationId xmlns:a16="http://schemas.microsoft.com/office/drawing/2014/main" id="{730F2772-9FC0-5C82-797A-7CD4AB1133A9}"/>
+              </a:ext>
+            </a:extLst>
+          </p:cNvPr>
+          <p:cNvSpPr/>
+          <p:nvPr/>
+        </p:nvSpPr>
+        <p:spPr>
+          <a:xfrm>
+            <a:off x="5321497" y="1895300"/>
+            <a:ext cx="1029810" cy="816746"/>
+          </a:xfrm>
+          <a:prstGeom prst="upArrow">
+            <a:avLst/>
+          </a:prstGeom>
+        </p:spPr>
+        <p:style>
+          <a:lnRef idx="2">
+            <a:schemeClr val="accent1">
+              <a:shade val="50000"/>
+            </a:schemeClr>
+          </a:lnRef>
+          <a:fillRef idx="1">
+            <a:schemeClr val="accent1"/>
+          </a:fillRef>
+          <a:effectRef idx="0">
+            <a:schemeClr val="accent1"/>
+          </a:effectRef>
+          <a:fontRef idx="minor">
+            <a:schemeClr val="lt1"/>
+          </a:fontRef>
+        </p:style>
+        <p:txBody>
+          <a:bodyPr rtlCol="0" anchor="ctr"/>
+          <a:lstStyle/>
+          <a:p>
+            <a:pPr algn="ctr"/>
+            <a:endParaRPr lang="en-GB"/>
+          </a:p>
+        </p:txBody>
+      </p:sp>
+      <p:sp>
+        <p:nvSpPr>
+          <p:cNvPr id="15" name="Arrow: Left 14">
+            <a:extLst>
+              <a:ext uri="{FF2B5EF4-FFF2-40B4-BE49-F238E27FC236}">
+                <a16:creationId xmlns:a16="http://schemas.microsoft.com/office/drawing/2014/main" id="{8A5C2C9A-F0E1-6C50-68E5-863B0DC67500}"/>
+              </a:ext>
+            </a:extLst>
+          </p:cNvPr>
+          <p:cNvSpPr/>
+          <p:nvPr/>
+        </p:nvSpPr>
+        <p:spPr>
+          <a:xfrm>
+            <a:off x="3710866" y="488272"/>
+            <a:ext cx="695418" cy="623604"/>
+          </a:xfrm>
+          <a:prstGeom prst="leftArrow">
+            <a:avLst/>
+          </a:prstGeom>
+        </p:spPr>
+        <p:style>
+          <a:lnRef idx="2">
+            <a:schemeClr val="accent1">
+              <a:shade val="50000"/>
+            </a:schemeClr>
+          </a:lnRef>
+          <a:fillRef idx="1">
+            <a:schemeClr val="accent1"/>
+          </a:fillRef>
+          <a:effectRef idx="0">
+            <a:schemeClr val="accent1"/>
+          </a:effectRef>
+          <a:fontRef idx="minor">
+            <a:schemeClr val="lt1"/>
+          </a:fontRef>
+        </p:style>
+        <p:txBody>
+          <a:bodyPr rtlCol="0" anchor="ctr"/>
+          <a:lstStyle/>
+          <a:p>
+            <a:pPr algn="ctr"/>
+            <a:endParaRPr lang="en-GB"/>
+          </a:p>
+        </p:txBody>
+      </p:sp>
+      <p:sp>
+        <p:nvSpPr>
+          <p:cNvPr id="16" name="Arrow: Left 15">
+            <a:extLst>
+              <a:ext uri="{FF2B5EF4-FFF2-40B4-BE49-F238E27FC236}">
+                <a16:creationId xmlns:a16="http://schemas.microsoft.com/office/drawing/2014/main" id="{576F2A10-5582-3CEA-F52D-83993EE3C344}"/>
+              </a:ext>
+            </a:extLst>
+          </p:cNvPr>
+          <p:cNvSpPr/>
+          <p:nvPr/>
+        </p:nvSpPr>
+        <p:spPr>
+          <a:xfrm rot="10800000">
+            <a:off x="6766412" y="488272"/>
+            <a:ext cx="695418" cy="623604"/>
+          </a:xfrm>
+          <a:prstGeom prst="leftArrow">
+            <a:avLst/>
+          </a:prstGeom>
+        </p:spPr>
+        <p:style>
+          <a:lnRef idx="2">
+            <a:schemeClr val="accent1">
+              <a:shade val="50000"/>
+            </a:schemeClr>
+          </a:lnRef>
+          <a:fillRef idx="1">
+            <a:schemeClr val="accent1"/>
+          </a:fillRef>
+          <a:effectRef idx="0">
+            <a:schemeClr val="accent1"/>
+          </a:effectRef>
+          <a:fontRef idx="minor">
+            <a:schemeClr val="lt1"/>
+          </a:fontRef>
+        </p:style>
+        <p:txBody>
+          <a:bodyPr rtlCol="0" anchor="ctr"/>
+          <a:lstStyle/>
+          <a:p>
+            <a:pPr algn="ctr"/>
+            <a:endParaRPr lang="en-GB"/>
+          </a:p>
+        </p:txBody>
+      </p:sp>
+    </p:spTree>
+    <p:extLst>
+      <p:ext uri="{BB962C8B-B14F-4D97-AF65-F5344CB8AC3E}">
+        <p14:creationId xmlns:p14="http://schemas.microsoft.com/office/powerpoint/2010/main" val="676187737"/>
+      </p:ext>
+    </p:extLst>
+  </p:cSld>
+  <p:clrMapOvr>
+    <a:masterClrMapping/>
+  </p:clrMapOvr>
+</p:sld>
+</file>
+
+<file path=ppt/slides/slide4.xml><?xml version="1.0" encoding="utf-8"?>
+<p:sld xmlns:a="http://schemas.openxmlformats.org/drawingml/2006/main" xmlns:r="http://schemas.openxmlformats.org/officeDocument/2006/relationships" xmlns:p="http://schemas.openxmlformats.org/presentationml/2006/main">
+  <p:cSld>
+    <p:spTree>
+      <p:nvGrpSpPr>
+        <p:cNvPr id="1" name=""/>
+        <p:cNvGrpSpPr/>
+        <p:nvPr/>
+      </p:nvGrpSpPr>
+      <p:grpSpPr>
+        <a:xfrm>
+          <a:off x="0" y="0"/>
+          <a:ext cx="0" cy="0"/>
+          <a:chOff x="0" y="0"/>
+          <a:chExt cx="0" cy="0"/>
+        </a:xfrm>
+      </p:grpSpPr>
+      <p:sp>
+        <p:nvSpPr>
+          <p:cNvPr id="16" name="Rectangle: Rounded Corners 15">
+            <a:extLst>
+              <a:ext uri="{FF2B5EF4-FFF2-40B4-BE49-F238E27FC236}">
+                <a16:creationId xmlns:a16="http://schemas.microsoft.com/office/drawing/2014/main" id="{DC54A2A0-80CF-81F7-8B0E-DA05F1703D2C}"/>
+              </a:ext>
+            </a:extLst>
+          </p:cNvPr>
+          <p:cNvSpPr/>
+          <p:nvPr/>
+        </p:nvSpPr>
+        <p:spPr>
+          <a:xfrm>
+            <a:off x="8553132" y="705183"/>
+            <a:ext cx="3293428" cy="5219238"/>
+          </a:xfrm>
+          <a:prstGeom prst="roundRect">
+            <a:avLst/>
+          </a:prstGeom>
+          <a:solidFill>
+            <a:schemeClr val="accent4">
+              <a:alpha val="20000"/>
+            </a:schemeClr>
+          </a:solidFill>
+          <a:ln>
+            <a:prstDash val="lgDashDot"/>
+          </a:ln>
+        </p:spPr>
+        <p:style>
+          <a:lnRef idx="2">
+            <a:schemeClr val="accent1">
+              <a:shade val="50000"/>
+            </a:schemeClr>
+          </a:lnRef>
+          <a:fillRef idx="1">
+            <a:schemeClr val="accent1"/>
+          </a:fillRef>
+          <a:effectRef idx="0">
+            <a:schemeClr val="accent1"/>
+          </a:effectRef>
+          <a:fontRef idx="minor">
+            <a:schemeClr val="lt1"/>
+          </a:fontRef>
+        </p:style>
+        <p:txBody>
+          <a:bodyPr rtlCol="0" anchor="ctr"/>
+          <a:lstStyle/>
+          <a:p>
+            <a:pPr algn="ctr"/>
+            <a:endParaRPr lang="en-GB"/>
+          </a:p>
+        </p:txBody>
+      </p:sp>
+      <p:pic>
+        <p:nvPicPr>
+          <p:cNvPr id="3" name="Graphic 2">
+            <a:extLst>
+              <a:ext uri="{FF2B5EF4-FFF2-40B4-BE49-F238E27FC236}">
+                <a16:creationId xmlns:a16="http://schemas.microsoft.com/office/drawing/2014/main" id="{CEAD806F-4A73-000C-08FB-95C5B70A8960}"/>
+              </a:ext>
+            </a:extLst>
+          </p:cNvPr>
+          <p:cNvPicPr>
+            <a:picLocks noChangeAspect="1"/>
+          </p:cNvPicPr>
+          <p:nvPr/>
+        </p:nvPicPr>
+        <p:blipFill>
+          <a:blip r:embed="rId2">
+            <a:extLst>
+              <a:ext uri="{28A0092B-C50C-407E-A947-70E740481C1C}">
+                <a14:useLocalDpi xmlns:a14="http://schemas.microsoft.com/office/drawing/2010/main" val="0"/>
+              </a:ext>
+              <a:ext uri="{96DAC541-7B7A-43D3-8B79-37D633B846F1}">
+                <asvg:svgBlip xmlns:asvg="http://schemas.microsoft.com/office/drawing/2016/SVG/main" r:embed="rId3"/>
+              </a:ext>
+            </a:extLst>
+          </a:blip>
+          <a:stretch>
+            <a:fillRect/>
+          </a:stretch>
+        </p:blipFill>
+        <p:spPr>
+          <a:xfrm>
+            <a:off x="5214269" y="906914"/>
+            <a:ext cx="678309" cy="678309"/>
+          </a:xfrm>
+          <a:prstGeom prst="rect">
+            <a:avLst/>
+          </a:prstGeom>
+        </p:spPr>
+      </p:pic>
+      <p:sp>
+        <p:nvSpPr>
+          <p:cNvPr id="4" name="TextBox 3">
+            <a:extLst>
+              <a:ext uri="{FF2B5EF4-FFF2-40B4-BE49-F238E27FC236}">
+                <a16:creationId xmlns:a16="http://schemas.microsoft.com/office/drawing/2014/main" id="{6488D5B7-500C-3909-3503-22DB5B40F101}"/>
+              </a:ext>
+            </a:extLst>
+          </p:cNvPr>
+          <p:cNvSpPr txBox="1"/>
+          <p:nvPr/>
+        </p:nvSpPr>
+        <p:spPr>
+          <a:xfrm>
+            <a:off x="4527428" y="210655"/>
+            <a:ext cx="2230174" cy="369332"/>
+          </a:xfrm>
+          <a:prstGeom prst="rect">
+            <a:avLst/>
+          </a:prstGeom>
+          <a:noFill/>
+        </p:spPr>
+        <p:txBody>
+          <a:bodyPr wrap="square" rtlCol="0">
+            <a:spAutoFit/>
+          </a:bodyPr>
+          <a:lstStyle/>
+          <a:p>
+            <a:r>
+              <a:rPr lang="en-GB" b="1" dirty="0"/>
+              <a:t>Storage account</a:t>
+            </a:r>
+          </a:p>
+        </p:txBody>
+      </p:sp>
+      <p:sp>
+        <p:nvSpPr>
+          <p:cNvPr id="5" name="Flowchart: Magnetic Disk 4">
+            <a:extLst>
+              <a:ext uri="{FF2B5EF4-FFF2-40B4-BE49-F238E27FC236}">
+                <a16:creationId xmlns:a16="http://schemas.microsoft.com/office/drawing/2014/main" id="{EAC5BFE0-CFAE-56A1-6514-A6961594061C}"/>
+              </a:ext>
+            </a:extLst>
+          </p:cNvPr>
+          <p:cNvSpPr/>
+          <p:nvPr/>
+        </p:nvSpPr>
+        <p:spPr>
+          <a:xfrm>
+            <a:off x="5353676" y="2329797"/>
+            <a:ext cx="399495" cy="390692"/>
+          </a:xfrm>
+          <a:prstGeom prst="flowChartMagneticDisk">
+            <a:avLst/>
+          </a:prstGeom>
+        </p:spPr>
+        <p:style>
+          <a:lnRef idx="2">
+            <a:schemeClr val="accent1">
+              <a:shade val="50000"/>
+            </a:schemeClr>
+          </a:lnRef>
+          <a:fillRef idx="1">
+            <a:schemeClr val="accent1"/>
+          </a:fillRef>
+          <a:effectRef idx="0">
+            <a:schemeClr val="accent1"/>
+          </a:effectRef>
+          <a:fontRef idx="minor">
+            <a:schemeClr val="lt1"/>
+          </a:fontRef>
+        </p:style>
+        <p:txBody>
+          <a:bodyPr rtlCol="0" anchor="ctr"/>
+          <a:lstStyle/>
+          <a:p>
+            <a:pPr algn="ctr"/>
+            <a:endParaRPr lang="en-GB"/>
+          </a:p>
+        </p:txBody>
+      </p:sp>
+      <p:sp>
+        <p:nvSpPr>
+          <p:cNvPr id="6" name="Flowchart: Magnetic Disk 5">
+            <a:extLst>
+              <a:ext uri="{FF2B5EF4-FFF2-40B4-BE49-F238E27FC236}">
+                <a16:creationId xmlns:a16="http://schemas.microsoft.com/office/drawing/2014/main" id="{14DBD47F-95EF-27AB-F840-F970F99ACB3D}"/>
+              </a:ext>
+            </a:extLst>
+          </p:cNvPr>
+          <p:cNvSpPr/>
+          <p:nvPr/>
+        </p:nvSpPr>
+        <p:spPr>
+          <a:xfrm>
+            <a:off x="5353676" y="3459480"/>
+            <a:ext cx="399495" cy="390692"/>
+          </a:xfrm>
+          <a:prstGeom prst="flowChartMagneticDisk">
+            <a:avLst/>
+          </a:prstGeom>
+        </p:spPr>
+        <p:style>
+          <a:lnRef idx="2">
+            <a:schemeClr val="accent1">
+              <a:shade val="50000"/>
+            </a:schemeClr>
+          </a:lnRef>
+          <a:fillRef idx="1">
+            <a:schemeClr val="accent1"/>
+          </a:fillRef>
+          <a:effectRef idx="0">
+            <a:schemeClr val="accent1"/>
+          </a:effectRef>
+          <a:fontRef idx="minor">
+            <a:schemeClr val="lt1"/>
+          </a:fontRef>
+        </p:style>
+        <p:txBody>
+          <a:bodyPr rtlCol="0" anchor="ctr"/>
+          <a:lstStyle/>
+          <a:p>
+            <a:pPr algn="ctr"/>
+            <a:endParaRPr lang="en-GB"/>
+          </a:p>
+        </p:txBody>
+      </p:sp>
+      <p:sp>
+        <p:nvSpPr>
+          <p:cNvPr id="7" name="Flowchart: Magnetic Disk 6">
+            <a:extLst>
+              <a:ext uri="{FF2B5EF4-FFF2-40B4-BE49-F238E27FC236}">
+                <a16:creationId xmlns:a16="http://schemas.microsoft.com/office/drawing/2014/main" id="{4CCF0A34-6832-7470-A4A2-A16387A35EAD}"/>
+              </a:ext>
+            </a:extLst>
+          </p:cNvPr>
+          <p:cNvSpPr/>
+          <p:nvPr/>
+        </p:nvSpPr>
+        <p:spPr>
+          <a:xfrm>
+            <a:off x="5353676" y="4681435"/>
+            <a:ext cx="399495" cy="390692"/>
+          </a:xfrm>
+          <a:prstGeom prst="flowChartMagneticDisk">
+            <a:avLst/>
+          </a:prstGeom>
+        </p:spPr>
+        <p:style>
+          <a:lnRef idx="2">
+            <a:schemeClr val="accent1">
+              <a:shade val="50000"/>
+            </a:schemeClr>
+          </a:lnRef>
+          <a:fillRef idx="1">
+            <a:schemeClr val="accent1"/>
+          </a:fillRef>
+          <a:effectRef idx="0">
+            <a:schemeClr val="accent1"/>
+          </a:effectRef>
+          <a:fontRef idx="minor">
+            <a:schemeClr val="lt1"/>
+          </a:fontRef>
+        </p:style>
+        <p:txBody>
+          <a:bodyPr rtlCol="0" anchor="ctr"/>
+          <a:lstStyle/>
+          <a:p>
+            <a:pPr algn="ctr"/>
+            <a:endParaRPr lang="en-GB"/>
+          </a:p>
+        </p:txBody>
+      </p:sp>
+      <p:sp>
+        <p:nvSpPr>
+          <p:cNvPr id="8" name="TextBox 7">
+            <a:extLst>
+              <a:ext uri="{FF2B5EF4-FFF2-40B4-BE49-F238E27FC236}">
+                <a16:creationId xmlns:a16="http://schemas.microsoft.com/office/drawing/2014/main" id="{748805DD-ADAE-7B8F-D01B-BB959AD55FEB}"/>
+              </a:ext>
+            </a:extLst>
+          </p:cNvPr>
+          <p:cNvSpPr txBox="1"/>
+          <p:nvPr/>
+        </p:nvSpPr>
+        <p:spPr>
+          <a:xfrm>
+            <a:off x="4438336" y="2759966"/>
+            <a:ext cx="2230174" cy="369332"/>
+          </a:xfrm>
+          <a:prstGeom prst="rect">
+            <a:avLst/>
+          </a:prstGeom>
+          <a:noFill/>
+        </p:spPr>
+        <p:txBody>
+          <a:bodyPr wrap="square" rtlCol="0">
+            <a:spAutoFit/>
+          </a:bodyPr>
+          <a:lstStyle/>
+          <a:p>
+            <a:r>
+              <a:rPr lang="en-GB" dirty="0"/>
+              <a:t>Stock prices container</a:t>
+            </a:r>
+          </a:p>
+        </p:txBody>
+      </p:sp>
+      <p:sp>
+        <p:nvSpPr>
+          <p:cNvPr id="9" name="TextBox 8">
+            <a:extLst>
+              <a:ext uri="{FF2B5EF4-FFF2-40B4-BE49-F238E27FC236}">
+                <a16:creationId xmlns:a16="http://schemas.microsoft.com/office/drawing/2014/main" id="{65818ADE-9DB3-92ED-6072-632612E67292}"/>
+              </a:ext>
+            </a:extLst>
+          </p:cNvPr>
+          <p:cNvSpPr txBox="1"/>
+          <p:nvPr/>
+        </p:nvSpPr>
+        <p:spPr>
+          <a:xfrm>
+            <a:off x="4268181" y="3879268"/>
+            <a:ext cx="2570485" cy="369332"/>
+          </a:xfrm>
+          <a:prstGeom prst="rect">
+            <a:avLst/>
+          </a:prstGeom>
+          <a:noFill/>
+        </p:spPr>
+        <p:txBody>
+          <a:bodyPr wrap="square" rtlCol="0">
+            <a:spAutoFit/>
+          </a:bodyPr>
+          <a:lstStyle/>
+          <a:p>
+            <a:r>
+              <a:rPr lang="en-GB" dirty="0"/>
+              <a:t>Energy prices container</a:t>
+            </a:r>
+          </a:p>
+        </p:txBody>
+      </p:sp>
+      <p:sp>
+        <p:nvSpPr>
+          <p:cNvPr id="10" name="TextBox 9">
+            <a:extLst>
+              <a:ext uri="{FF2B5EF4-FFF2-40B4-BE49-F238E27FC236}">
+                <a16:creationId xmlns:a16="http://schemas.microsoft.com/office/drawing/2014/main" id="{CEB8D8C2-8EAD-D92B-A4F7-CC63F1013F5A}"/>
+              </a:ext>
+            </a:extLst>
+          </p:cNvPr>
+          <p:cNvSpPr txBox="1"/>
+          <p:nvPr/>
+        </p:nvSpPr>
+        <p:spPr>
+          <a:xfrm>
+            <a:off x="4119726" y="5129459"/>
+            <a:ext cx="2867395" cy="369332"/>
+          </a:xfrm>
+          <a:prstGeom prst="rect">
+            <a:avLst/>
+          </a:prstGeom>
+          <a:noFill/>
+        </p:spPr>
+        <p:txBody>
+          <a:bodyPr wrap="square" rtlCol="0">
+            <a:spAutoFit/>
+          </a:bodyPr>
+          <a:lstStyle/>
+          <a:p>
+            <a:r>
+              <a:rPr lang="en-GB" dirty="0"/>
+              <a:t>Commodity  prices container</a:t>
+            </a:r>
+          </a:p>
+        </p:txBody>
+      </p:sp>
+      <p:sp>
+        <p:nvSpPr>
+          <p:cNvPr id="11" name="Rectangle: Rounded Corners 10">
+            <a:extLst>
+              <a:ext uri="{FF2B5EF4-FFF2-40B4-BE49-F238E27FC236}">
+                <a16:creationId xmlns:a16="http://schemas.microsoft.com/office/drawing/2014/main" id="{3A384B5C-5E83-288F-D249-CA82199D095E}"/>
+              </a:ext>
+            </a:extLst>
+          </p:cNvPr>
+          <p:cNvSpPr/>
+          <p:nvPr/>
+        </p:nvSpPr>
+        <p:spPr>
+          <a:xfrm>
+            <a:off x="4003040" y="705183"/>
+            <a:ext cx="2984082" cy="5219238"/>
+          </a:xfrm>
+          <a:prstGeom prst="roundRect">
+            <a:avLst/>
+          </a:prstGeom>
+          <a:solidFill>
+            <a:srgbClr val="00B0F0">
+              <a:alpha val="20000"/>
+            </a:srgbClr>
+          </a:solidFill>
+          <a:ln>
+            <a:prstDash val="lgDashDot"/>
+          </a:ln>
+        </p:spPr>
+        <p:style>
+          <a:lnRef idx="2">
+            <a:schemeClr val="accent1">
+              <a:shade val="50000"/>
+            </a:schemeClr>
+          </a:lnRef>
+          <a:fillRef idx="1">
+            <a:schemeClr val="accent1"/>
+          </a:fillRef>
+          <a:effectRef idx="0">
+            <a:schemeClr val="accent1"/>
+          </a:effectRef>
+          <a:fontRef idx="minor">
+            <a:schemeClr val="lt1"/>
+          </a:fontRef>
+        </p:style>
+        <p:txBody>
+          <a:bodyPr rtlCol="0" anchor="ctr"/>
+          <a:lstStyle/>
+          <a:p>
+            <a:pPr algn="ctr"/>
+            <a:endParaRPr lang="en-GB"/>
+          </a:p>
+        </p:txBody>
+      </p:sp>
+      <p:sp>
+        <p:nvSpPr>
+          <p:cNvPr id="12" name="Rectangle: Rounded Corners 11">
+            <a:extLst>
+              <a:ext uri="{FF2B5EF4-FFF2-40B4-BE49-F238E27FC236}">
+                <a16:creationId xmlns:a16="http://schemas.microsoft.com/office/drawing/2014/main" id="{0BF5E1AE-475A-FCD9-33B8-5CC56C3584DE}"/>
+              </a:ext>
+            </a:extLst>
+          </p:cNvPr>
+          <p:cNvSpPr/>
+          <p:nvPr/>
+        </p:nvSpPr>
+        <p:spPr>
+          <a:xfrm>
+            <a:off x="103275" y="2729486"/>
+            <a:ext cx="2555289" cy="896645"/>
+          </a:xfrm>
+          <a:prstGeom prst="roundRect">
+            <a:avLst/>
+          </a:prstGeom>
+        </p:spPr>
+        <p:style>
+          <a:lnRef idx="2">
+            <a:schemeClr val="accent4">
+              <a:shade val="50000"/>
+            </a:schemeClr>
+          </a:lnRef>
+          <a:fillRef idx="1">
+            <a:schemeClr val="accent4"/>
+          </a:fillRef>
+          <a:effectRef idx="0">
+            <a:schemeClr val="accent4"/>
+          </a:effectRef>
+          <a:fontRef idx="minor">
+            <a:schemeClr val="lt1"/>
+          </a:fontRef>
+        </p:style>
+        <p:txBody>
+          <a:bodyPr rtlCol="0" anchor="ctr"/>
+          <a:lstStyle/>
+          <a:p>
+            <a:pPr algn="ctr"/>
+            <a:r>
+              <a:rPr lang="en-GB" sz="3600" dirty="0">
+                <a:ln w="0"/>
+                <a:solidFill>
+                  <a:schemeClr val="tx1"/>
+                </a:solidFill>
+                <a:effectLst>
+                  <a:outerShdw blurRad="38100" dist="19050" dir="2700000" algn="tl" rotWithShape="0">
+                    <a:schemeClr val="dk1">
+                      <a:alpha val="40000"/>
+                    </a:schemeClr>
+                  </a:outerShdw>
+                </a:effectLst>
+              </a:rPr>
+              <a:t>External CSVs</a:t>
+            </a:r>
+          </a:p>
+        </p:txBody>
+      </p:sp>
+      <p:sp>
+        <p:nvSpPr>
+          <p:cNvPr id="13" name="Arrow: Left 12">
+            <a:extLst>
+              <a:ext uri="{FF2B5EF4-FFF2-40B4-BE49-F238E27FC236}">
+                <a16:creationId xmlns:a16="http://schemas.microsoft.com/office/drawing/2014/main" id="{6AABC729-06AE-BB0C-AA0A-2B17DC44A497}"/>
+              </a:ext>
+            </a:extLst>
+          </p:cNvPr>
+          <p:cNvSpPr/>
+          <p:nvPr/>
+        </p:nvSpPr>
+        <p:spPr>
+          <a:xfrm rot="10800000">
+            <a:off x="3093860" y="2835876"/>
+            <a:ext cx="695418" cy="623604"/>
+          </a:xfrm>
+          <a:prstGeom prst="leftArrow">
+            <a:avLst/>
+          </a:prstGeom>
+        </p:spPr>
+        <p:style>
+          <a:lnRef idx="2">
+            <a:schemeClr val="accent1">
+              <a:shade val="50000"/>
+            </a:schemeClr>
+          </a:lnRef>
+          <a:fillRef idx="1">
+            <a:schemeClr val="accent1"/>
+          </a:fillRef>
+          <a:effectRef idx="0">
+            <a:schemeClr val="accent1"/>
+          </a:effectRef>
+          <a:fontRef idx="minor">
+            <a:schemeClr val="lt1"/>
+          </a:fontRef>
+        </p:style>
+        <p:txBody>
+          <a:bodyPr rtlCol="0" anchor="ctr"/>
+          <a:lstStyle/>
+          <a:p>
+            <a:pPr algn="ctr"/>
+            <a:endParaRPr lang="en-GB"/>
+          </a:p>
+        </p:txBody>
+      </p:sp>
+      <p:sp>
+        <p:nvSpPr>
+          <p:cNvPr id="14" name="Arrow: Left 13">
+            <a:extLst>
+              <a:ext uri="{FF2B5EF4-FFF2-40B4-BE49-F238E27FC236}">
+                <a16:creationId xmlns:a16="http://schemas.microsoft.com/office/drawing/2014/main" id="{27E9C165-7DCB-EC94-ECF0-765F053B8200}"/>
+              </a:ext>
+            </a:extLst>
+          </p:cNvPr>
+          <p:cNvSpPr/>
+          <p:nvPr/>
+        </p:nvSpPr>
+        <p:spPr>
+          <a:xfrm rot="10800000">
+            <a:off x="7422418" y="2866006"/>
+            <a:ext cx="695418" cy="623604"/>
+          </a:xfrm>
+          <a:prstGeom prst="leftArrow">
+            <a:avLst/>
+          </a:prstGeom>
+        </p:spPr>
+        <p:style>
+          <a:lnRef idx="2">
+            <a:schemeClr val="accent1">
+              <a:shade val="50000"/>
+            </a:schemeClr>
+          </a:lnRef>
+          <a:fillRef idx="1">
+            <a:schemeClr val="accent1"/>
+          </a:fillRef>
+          <a:effectRef idx="0">
+            <a:schemeClr val="accent1"/>
+          </a:effectRef>
+          <a:fontRef idx="minor">
+            <a:schemeClr val="lt1"/>
+          </a:fontRef>
+        </p:style>
+        <p:txBody>
+          <a:bodyPr rtlCol="0" anchor="ctr"/>
+          <a:lstStyle/>
+          <a:p>
+            <a:pPr algn="ctr"/>
+            <a:endParaRPr lang="en-GB"/>
+          </a:p>
+        </p:txBody>
+      </p:sp>
+      <p:sp>
+        <p:nvSpPr>
+          <p:cNvPr id="15" name="TextBox 14">
+            <a:extLst>
+              <a:ext uri="{FF2B5EF4-FFF2-40B4-BE49-F238E27FC236}">
+                <a16:creationId xmlns:a16="http://schemas.microsoft.com/office/drawing/2014/main" id="{4843FF52-466C-6A8E-2A93-4FCB0FD5256B}"/>
+              </a:ext>
+            </a:extLst>
+          </p:cNvPr>
+          <p:cNvSpPr txBox="1"/>
+          <p:nvPr/>
+        </p:nvSpPr>
+        <p:spPr>
+          <a:xfrm>
+            <a:off x="8986520" y="1262057"/>
+            <a:ext cx="2479040" cy="369332"/>
+          </a:xfrm>
+          <a:prstGeom prst="rect">
+            <a:avLst/>
+          </a:prstGeom>
+          <a:noFill/>
+          <a:ln>
+            <a:solidFill>
+              <a:schemeClr val="accent1">
+                <a:shade val="50000"/>
+              </a:schemeClr>
+            </a:solidFill>
+          </a:ln>
+        </p:spPr>
+        <p:txBody>
+          <a:bodyPr wrap="square" rtlCol="0">
+            <a:spAutoFit/>
+          </a:bodyPr>
+          <a:lstStyle/>
+          <a:p>
+            <a:r>
+              <a:rPr lang="en-GB" dirty="0"/>
+              <a:t>SELECT * FROM Stocks</a:t>
+            </a:r>
+          </a:p>
+        </p:txBody>
+      </p:sp>
+      <p:sp>
+        <p:nvSpPr>
+          <p:cNvPr id="17" name="TextBox 16">
+            <a:extLst>
+              <a:ext uri="{FF2B5EF4-FFF2-40B4-BE49-F238E27FC236}">
+                <a16:creationId xmlns:a16="http://schemas.microsoft.com/office/drawing/2014/main" id="{726DE61E-01BE-2871-8156-91998F3C3CF3}"/>
+              </a:ext>
+            </a:extLst>
+          </p:cNvPr>
+          <p:cNvSpPr txBox="1"/>
+          <p:nvPr/>
+        </p:nvSpPr>
+        <p:spPr>
+          <a:xfrm>
+            <a:off x="8895080" y="3063413"/>
+            <a:ext cx="2661921" cy="369332"/>
+          </a:xfrm>
+          <a:prstGeom prst="rect">
+            <a:avLst/>
+          </a:prstGeom>
+          <a:noFill/>
+          <a:ln>
+            <a:solidFill>
+              <a:schemeClr val="accent1">
+                <a:shade val="50000"/>
+              </a:schemeClr>
+            </a:solidFill>
+          </a:ln>
+        </p:spPr>
+        <p:txBody>
+          <a:bodyPr wrap="square" rtlCol="0">
+            <a:spAutoFit/>
+          </a:bodyPr>
+          <a:lstStyle/>
+          <a:p>
+            <a:r>
+              <a:rPr lang="en-GB" dirty="0"/>
+              <a:t>SELECT * FROM </a:t>
+            </a:r>
+            <a:r>
+              <a:rPr lang="en-GB" dirty="0" err="1"/>
+              <a:t>CoalPrices</a:t>
+            </a:r>
+            <a:endParaRPr lang="en-GB" dirty="0"/>
+          </a:p>
+        </p:txBody>
+      </p:sp>
+      <p:sp>
+        <p:nvSpPr>
+          <p:cNvPr id="18" name="TextBox 17">
+            <a:extLst>
+              <a:ext uri="{FF2B5EF4-FFF2-40B4-BE49-F238E27FC236}">
+                <a16:creationId xmlns:a16="http://schemas.microsoft.com/office/drawing/2014/main" id="{B8A905B1-7B35-C8A7-0DC4-C9B1353F6336}"/>
+              </a:ext>
+            </a:extLst>
+          </p:cNvPr>
+          <p:cNvSpPr txBox="1"/>
+          <p:nvPr/>
+        </p:nvSpPr>
+        <p:spPr>
+          <a:xfrm>
+            <a:off x="8742681" y="4864769"/>
+            <a:ext cx="2966719" cy="369332"/>
+          </a:xfrm>
+          <a:prstGeom prst="rect">
+            <a:avLst/>
+          </a:prstGeom>
+          <a:noFill/>
+          <a:ln>
+            <a:solidFill>
+              <a:schemeClr val="accent1">
+                <a:shade val="50000"/>
+              </a:schemeClr>
+            </a:solidFill>
+          </a:ln>
+        </p:spPr>
+        <p:txBody>
+          <a:bodyPr wrap="square" rtlCol="0">
+            <a:spAutoFit/>
+          </a:bodyPr>
+          <a:lstStyle/>
+          <a:p>
+            <a:r>
+              <a:rPr lang="en-GB" dirty="0"/>
+              <a:t>SELECT * FROM Commodity</a:t>
+            </a:r>
+          </a:p>
+        </p:txBody>
+      </p:sp>
+      <p:sp>
+        <p:nvSpPr>
+          <p:cNvPr id="19" name="TextBox 18">
+            <a:extLst>
+              <a:ext uri="{FF2B5EF4-FFF2-40B4-BE49-F238E27FC236}">
+                <a16:creationId xmlns:a16="http://schemas.microsoft.com/office/drawing/2014/main" id="{2DD20C61-A774-661C-5765-52A98EF5813D}"/>
+              </a:ext>
+            </a:extLst>
+          </p:cNvPr>
+          <p:cNvSpPr txBox="1"/>
+          <p:nvPr/>
+        </p:nvSpPr>
+        <p:spPr>
+          <a:xfrm>
+            <a:off x="9047480" y="96787"/>
+            <a:ext cx="2794001" cy="646331"/>
+          </a:xfrm>
+          <a:prstGeom prst="rect">
+            <a:avLst/>
+          </a:prstGeom>
+          <a:noFill/>
+        </p:spPr>
+        <p:txBody>
+          <a:bodyPr wrap="square" rtlCol="0">
+            <a:spAutoFit/>
+          </a:bodyPr>
+          <a:lstStyle/>
+          <a:p>
+            <a:pPr algn="ctr"/>
+            <a:r>
+              <a:rPr lang="en-GB" b="1" dirty="0"/>
+              <a:t>Synapse – serverless – external tables</a:t>
+            </a:r>
+          </a:p>
+        </p:txBody>
+      </p:sp>
+    </p:spTree>
+    <p:extLst>
+      <p:ext uri="{BB962C8B-B14F-4D97-AF65-F5344CB8AC3E}">
+        <p14:creationId xmlns:p14="http://schemas.microsoft.com/office/powerpoint/2010/main" val="1466836778"/>
+      </p:ext>
+    </p:extLst>
+  </p:cSld>
+  <p:clrMapOvr>
+    <a:masterClrMapping/>
+  </p:clrMapOvr>
+</p:sld>
+</file>
+
 <file path=ppt/theme/theme1.xml><?xml version="1.0" encoding="utf-8"?>
 <a:theme xmlns:a="http://schemas.openxmlformats.org/drawingml/2006/main" name="Office Theme">
   <a:themeElements>

</xml_diff>

<commit_message>
Finished basic GIT integration
</commit_message>
<xml_diff>
--- a/synapse-sqlviews-integrationtesting/docs/Synapse-Presentation1.pptx
+++ b/synapse-sqlviews-integrationtesting/docs/Synapse-Presentation1.pptx
@@ -5,7 +5,7 @@
     <p:sldMasterId id="2147483648" r:id="rId1"/>
   </p:sldMasterIdLst>
   <p:notesMasterIdLst>
-    <p:notesMasterId r:id="rId14"/>
+    <p:notesMasterId r:id="rId19"/>
   </p:notesMasterIdLst>
   <p:sldIdLst>
     <p:sldId id="256" r:id="rId2"/>
@@ -20,6 +20,11 @@
     <p:sldId id="264" r:id="rId11"/>
     <p:sldId id="266" r:id="rId12"/>
     <p:sldId id="267" r:id="rId13"/>
+    <p:sldId id="269" r:id="rId14"/>
+    <p:sldId id="268" r:id="rId15"/>
+    <p:sldId id="270" r:id="rId16"/>
+    <p:sldId id="271" r:id="rId17"/>
+    <p:sldId id="272" r:id="rId18"/>
   </p:sldIdLst>
   <p:sldSz cx="12192000" cy="6858000"/>
   <p:notesSz cx="6858000" cy="9144000"/>
@@ -208,7 +213,7 @@
           <a:p>
             <a:fld id="{88BBF65C-509D-444C-B06A-3481FFEB325E}" type="datetimeFigureOut">
               <a:rPr lang="en-GB" smtClean="0"/>
-              <a:t>20/07/2022</a:t>
+              <a:t>01/08/2022</a:t>
             </a:fld>
             <a:endParaRPr lang="en-GB"/>
           </a:p>
@@ -909,7 +914,7 @@
           <a:p>
             <a:fld id="{FC05764E-BF05-4ADF-9C0D-E7E7BE4B37C6}" type="datetimeFigureOut">
               <a:rPr lang="en-GB" smtClean="0"/>
-              <a:t>20/07/2022</a:t>
+              <a:t>01/08/2022</a:t>
             </a:fld>
             <a:endParaRPr lang="en-GB"/>
           </a:p>
@@ -1109,7 +1114,7 @@
           <a:p>
             <a:fld id="{FC05764E-BF05-4ADF-9C0D-E7E7BE4B37C6}" type="datetimeFigureOut">
               <a:rPr lang="en-GB" smtClean="0"/>
-              <a:t>20/07/2022</a:t>
+              <a:t>01/08/2022</a:t>
             </a:fld>
             <a:endParaRPr lang="en-GB"/>
           </a:p>
@@ -1319,7 +1324,7 @@
           <a:p>
             <a:fld id="{FC05764E-BF05-4ADF-9C0D-E7E7BE4B37C6}" type="datetimeFigureOut">
               <a:rPr lang="en-GB" smtClean="0"/>
-              <a:t>20/07/2022</a:t>
+              <a:t>01/08/2022</a:t>
             </a:fld>
             <a:endParaRPr lang="en-GB"/>
           </a:p>
@@ -1519,7 +1524,7 @@
           <a:p>
             <a:fld id="{FC05764E-BF05-4ADF-9C0D-E7E7BE4B37C6}" type="datetimeFigureOut">
               <a:rPr lang="en-GB" smtClean="0"/>
-              <a:t>20/07/2022</a:t>
+              <a:t>01/08/2022</a:t>
             </a:fld>
             <a:endParaRPr lang="en-GB"/>
           </a:p>
@@ -1795,7 +1800,7 @@
           <a:p>
             <a:fld id="{FC05764E-BF05-4ADF-9C0D-E7E7BE4B37C6}" type="datetimeFigureOut">
               <a:rPr lang="en-GB" smtClean="0"/>
-              <a:t>20/07/2022</a:t>
+              <a:t>01/08/2022</a:t>
             </a:fld>
             <a:endParaRPr lang="en-GB"/>
           </a:p>
@@ -2063,7 +2068,7 @@
           <a:p>
             <a:fld id="{FC05764E-BF05-4ADF-9C0D-E7E7BE4B37C6}" type="datetimeFigureOut">
               <a:rPr lang="en-GB" smtClean="0"/>
-              <a:t>20/07/2022</a:t>
+              <a:t>01/08/2022</a:t>
             </a:fld>
             <a:endParaRPr lang="en-GB"/>
           </a:p>
@@ -2478,7 +2483,7 @@
           <a:p>
             <a:fld id="{FC05764E-BF05-4ADF-9C0D-E7E7BE4B37C6}" type="datetimeFigureOut">
               <a:rPr lang="en-GB" smtClean="0"/>
-              <a:t>20/07/2022</a:t>
+              <a:t>01/08/2022</a:t>
             </a:fld>
             <a:endParaRPr lang="en-GB"/>
           </a:p>
@@ -2620,7 +2625,7 @@
           <a:p>
             <a:fld id="{FC05764E-BF05-4ADF-9C0D-E7E7BE4B37C6}" type="datetimeFigureOut">
               <a:rPr lang="en-GB" smtClean="0"/>
-              <a:t>20/07/2022</a:t>
+              <a:t>01/08/2022</a:t>
             </a:fld>
             <a:endParaRPr lang="en-GB"/>
           </a:p>
@@ -2733,7 +2738,7 @@
           <a:p>
             <a:fld id="{FC05764E-BF05-4ADF-9C0D-E7E7BE4B37C6}" type="datetimeFigureOut">
               <a:rPr lang="en-GB" smtClean="0"/>
-              <a:t>20/07/2022</a:t>
+              <a:t>01/08/2022</a:t>
             </a:fld>
             <a:endParaRPr lang="en-GB"/>
           </a:p>
@@ -3046,7 +3051,7 @@
           <a:p>
             <a:fld id="{FC05764E-BF05-4ADF-9C0D-E7E7BE4B37C6}" type="datetimeFigureOut">
               <a:rPr lang="en-GB" smtClean="0"/>
-              <a:t>20/07/2022</a:t>
+              <a:t>01/08/2022</a:t>
             </a:fld>
             <a:endParaRPr lang="en-GB"/>
           </a:p>
@@ -3335,7 +3340,7 @@
           <a:p>
             <a:fld id="{FC05764E-BF05-4ADF-9C0D-E7E7BE4B37C6}" type="datetimeFigureOut">
               <a:rPr lang="en-GB" smtClean="0"/>
-              <a:t>20/07/2022</a:t>
+              <a:t>01/08/2022</a:t>
             </a:fld>
             <a:endParaRPr lang="en-GB"/>
           </a:p>
@@ -3578,7 +3583,7 @@
           <a:p>
             <a:fld id="{FC05764E-BF05-4ADF-9C0D-E7E7BE4B37C6}" type="datetimeFigureOut">
               <a:rPr lang="en-GB" smtClean="0"/>
-              <a:t>20/07/2022</a:t>
+              <a:t>01/08/2022</a:t>
             </a:fld>
             <a:endParaRPr lang="en-GB"/>
           </a:p>
@@ -5276,6 +5281,899 @@
     <p:extLst>
       <p:ext uri="{BB962C8B-B14F-4D97-AF65-F5344CB8AC3E}">
         <p14:creationId xmlns:p14="http://schemas.microsoft.com/office/powerpoint/2010/main" val="3776028824"/>
+      </p:ext>
+    </p:extLst>
+  </p:cSld>
+  <p:clrMapOvr>
+    <a:masterClrMapping/>
+  </p:clrMapOvr>
+</p:sld>
+</file>
+
+<file path=ppt/slides/slide13.xml><?xml version="1.0" encoding="utf-8"?>
+<p:sld xmlns:a="http://schemas.openxmlformats.org/drawingml/2006/main" xmlns:r="http://schemas.openxmlformats.org/officeDocument/2006/relationships" xmlns:p="http://schemas.openxmlformats.org/presentationml/2006/main">
+  <p:cSld>
+    <p:spTree>
+      <p:nvGrpSpPr>
+        <p:cNvPr id="1" name=""/>
+        <p:cNvGrpSpPr/>
+        <p:nvPr/>
+      </p:nvGrpSpPr>
+      <p:grpSpPr>
+        <a:xfrm>
+          <a:off x="0" y="0"/>
+          <a:ext cx="0" cy="0"/>
+          <a:chOff x="0" y="0"/>
+          <a:chExt cx="0" cy="0"/>
+        </a:xfrm>
+      </p:grpSpPr>
+      <p:pic>
+        <p:nvPicPr>
+          <p:cNvPr id="7" name="Picture 6">
+            <a:extLst>
+              <a:ext uri="{FF2B5EF4-FFF2-40B4-BE49-F238E27FC236}">
+                <a16:creationId xmlns:a16="http://schemas.microsoft.com/office/drawing/2014/main" id="{D0FF2770-5C37-439D-B853-AA38FDFF2587}"/>
+              </a:ext>
+            </a:extLst>
+          </p:cNvPr>
+          <p:cNvPicPr>
+            <a:picLocks noChangeAspect="1"/>
+          </p:cNvPicPr>
+          <p:nvPr/>
+        </p:nvPicPr>
+        <p:blipFill>
+          <a:blip r:embed="rId2"/>
+          <a:stretch>
+            <a:fillRect/>
+          </a:stretch>
+        </p:blipFill>
+        <p:spPr>
+          <a:xfrm>
+            <a:off x="1091681" y="581705"/>
+            <a:ext cx="8534400" cy="4257675"/>
+          </a:xfrm>
+          <a:prstGeom prst="rect">
+            <a:avLst/>
+          </a:prstGeom>
+        </p:spPr>
+      </p:pic>
+      <p:sp>
+        <p:nvSpPr>
+          <p:cNvPr id="8" name="Rectangle: Rounded Corners 7">
+            <a:extLst>
+              <a:ext uri="{FF2B5EF4-FFF2-40B4-BE49-F238E27FC236}">
+                <a16:creationId xmlns:a16="http://schemas.microsoft.com/office/drawing/2014/main" id="{F4B781FF-FDFE-2B26-62E4-9BE6BDFD3F60}"/>
+              </a:ext>
+            </a:extLst>
+          </p:cNvPr>
+          <p:cNvSpPr/>
+          <p:nvPr/>
+        </p:nvSpPr>
+        <p:spPr>
+          <a:xfrm>
+            <a:off x="5803641" y="1436913"/>
+            <a:ext cx="3536302" cy="3685503"/>
+          </a:xfrm>
+          <a:prstGeom prst="roundRect">
+            <a:avLst/>
+          </a:prstGeom>
+          <a:noFill/>
+          <a:ln w="19050">
+            <a:prstDash val="dashDot"/>
+          </a:ln>
+        </p:spPr>
+        <p:style>
+          <a:lnRef idx="2">
+            <a:schemeClr val="accent1">
+              <a:shade val="50000"/>
+            </a:schemeClr>
+          </a:lnRef>
+          <a:fillRef idx="1">
+            <a:schemeClr val="accent1"/>
+          </a:fillRef>
+          <a:effectRef idx="0">
+            <a:schemeClr val="accent1"/>
+          </a:effectRef>
+          <a:fontRef idx="minor">
+            <a:schemeClr val="lt1"/>
+          </a:fontRef>
+        </p:style>
+        <p:txBody>
+          <a:bodyPr rtlCol="0" anchor="ctr"/>
+          <a:lstStyle/>
+          <a:p>
+            <a:pPr algn="ctr"/>
+            <a:endParaRPr lang="en-GB"/>
+          </a:p>
+        </p:txBody>
+      </p:sp>
+      <p:sp>
+        <p:nvSpPr>
+          <p:cNvPr id="9" name="Rectangle: Rounded Corners 8">
+            <a:extLst>
+              <a:ext uri="{FF2B5EF4-FFF2-40B4-BE49-F238E27FC236}">
+                <a16:creationId xmlns:a16="http://schemas.microsoft.com/office/drawing/2014/main" id="{85C0D22A-EC1A-78F4-E1CC-6788DB7B89BA}"/>
+              </a:ext>
+            </a:extLst>
+          </p:cNvPr>
+          <p:cNvSpPr/>
+          <p:nvPr/>
+        </p:nvSpPr>
+        <p:spPr>
+          <a:xfrm>
+            <a:off x="413658" y="2390236"/>
+            <a:ext cx="3536302" cy="889428"/>
+          </a:xfrm>
+          <a:prstGeom prst="roundRect">
+            <a:avLst/>
+          </a:prstGeom>
+          <a:noFill/>
+          <a:ln w="19050">
+            <a:prstDash val="dashDot"/>
+          </a:ln>
+        </p:spPr>
+        <p:style>
+          <a:lnRef idx="2">
+            <a:schemeClr val="accent1">
+              <a:shade val="50000"/>
+            </a:schemeClr>
+          </a:lnRef>
+          <a:fillRef idx="1">
+            <a:schemeClr val="accent1"/>
+          </a:fillRef>
+          <a:effectRef idx="0">
+            <a:schemeClr val="accent1"/>
+          </a:effectRef>
+          <a:fontRef idx="minor">
+            <a:schemeClr val="lt1"/>
+          </a:fontRef>
+        </p:style>
+        <p:txBody>
+          <a:bodyPr rtlCol="0" anchor="ctr"/>
+          <a:lstStyle/>
+          <a:p>
+            <a:pPr algn="ctr"/>
+            <a:endParaRPr lang="en-GB"/>
+          </a:p>
+        </p:txBody>
+      </p:sp>
+    </p:spTree>
+    <p:extLst>
+      <p:ext uri="{BB962C8B-B14F-4D97-AF65-F5344CB8AC3E}">
+        <p14:creationId xmlns:p14="http://schemas.microsoft.com/office/powerpoint/2010/main" val="677688060"/>
+      </p:ext>
+    </p:extLst>
+  </p:cSld>
+  <p:clrMapOvr>
+    <a:masterClrMapping/>
+  </p:clrMapOvr>
+</p:sld>
+</file>
+
+<file path=ppt/slides/slide14.xml><?xml version="1.0" encoding="utf-8"?>
+<p:sld xmlns:a="http://schemas.openxmlformats.org/drawingml/2006/main" xmlns:r="http://schemas.openxmlformats.org/officeDocument/2006/relationships" xmlns:p="http://schemas.openxmlformats.org/presentationml/2006/main">
+  <p:cSld>
+    <p:spTree>
+      <p:nvGrpSpPr>
+        <p:cNvPr id="1" name=""/>
+        <p:cNvGrpSpPr/>
+        <p:nvPr/>
+      </p:nvGrpSpPr>
+      <p:grpSpPr>
+        <a:xfrm>
+          <a:off x="0" y="0"/>
+          <a:ext cx="0" cy="0"/>
+          <a:chOff x="0" y="0"/>
+          <a:chExt cx="0" cy="0"/>
+        </a:xfrm>
+      </p:grpSpPr>
+      <p:pic>
+        <p:nvPicPr>
+          <p:cNvPr id="4" name="Picture 3">
+            <a:extLst>
+              <a:ext uri="{FF2B5EF4-FFF2-40B4-BE49-F238E27FC236}">
+                <a16:creationId xmlns:a16="http://schemas.microsoft.com/office/drawing/2014/main" id="{B82A9FDA-40C7-6B82-9806-1595B3A523CA}"/>
+              </a:ext>
+            </a:extLst>
+          </p:cNvPr>
+          <p:cNvPicPr>
+            <a:picLocks noChangeAspect="1"/>
+          </p:cNvPicPr>
+          <p:nvPr/>
+        </p:nvPicPr>
+        <p:blipFill>
+          <a:blip r:embed="rId2"/>
+          <a:stretch>
+            <a:fillRect/>
+          </a:stretch>
+        </p:blipFill>
+        <p:spPr>
+          <a:xfrm>
+            <a:off x="432756" y="0"/>
+            <a:ext cx="10729330" cy="6858000"/>
+          </a:xfrm>
+          <a:prstGeom prst="rect">
+            <a:avLst/>
+          </a:prstGeom>
+        </p:spPr>
+      </p:pic>
+      <p:sp>
+        <p:nvSpPr>
+          <p:cNvPr id="5" name="Rectangle: Rounded Corners 4">
+            <a:extLst>
+              <a:ext uri="{FF2B5EF4-FFF2-40B4-BE49-F238E27FC236}">
+                <a16:creationId xmlns:a16="http://schemas.microsoft.com/office/drawing/2014/main" id="{BAEA2636-3DC8-CED3-0FA0-1A66A0FF8833}"/>
+              </a:ext>
+            </a:extLst>
+          </p:cNvPr>
+          <p:cNvSpPr/>
+          <p:nvPr/>
+        </p:nvSpPr>
+        <p:spPr>
+          <a:xfrm>
+            <a:off x="133740" y="2903419"/>
+            <a:ext cx="3536302" cy="660875"/>
+          </a:xfrm>
+          <a:prstGeom prst="roundRect">
+            <a:avLst/>
+          </a:prstGeom>
+          <a:noFill/>
+          <a:ln w="19050">
+            <a:prstDash val="dashDot"/>
+          </a:ln>
+        </p:spPr>
+        <p:style>
+          <a:lnRef idx="2">
+            <a:schemeClr val="accent1">
+              <a:shade val="50000"/>
+            </a:schemeClr>
+          </a:lnRef>
+          <a:fillRef idx="1">
+            <a:schemeClr val="accent1"/>
+          </a:fillRef>
+          <a:effectRef idx="0">
+            <a:schemeClr val="accent1"/>
+          </a:effectRef>
+          <a:fontRef idx="minor">
+            <a:schemeClr val="lt1"/>
+          </a:fontRef>
+        </p:style>
+        <p:txBody>
+          <a:bodyPr rtlCol="0" anchor="ctr"/>
+          <a:lstStyle/>
+          <a:p>
+            <a:pPr algn="ctr"/>
+            <a:endParaRPr lang="en-GB"/>
+          </a:p>
+        </p:txBody>
+      </p:sp>
+      <p:sp>
+        <p:nvSpPr>
+          <p:cNvPr id="6" name="Rectangle: Rounded Corners 5">
+            <a:extLst>
+              <a:ext uri="{FF2B5EF4-FFF2-40B4-BE49-F238E27FC236}">
+                <a16:creationId xmlns:a16="http://schemas.microsoft.com/office/drawing/2014/main" id="{06BC09EF-B6D6-4828-C6B1-4DCCA0D57A85}"/>
+              </a:ext>
+            </a:extLst>
+          </p:cNvPr>
+          <p:cNvSpPr/>
+          <p:nvPr/>
+        </p:nvSpPr>
+        <p:spPr>
+          <a:xfrm>
+            <a:off x="2435289" y="6197125"/>
+            <a:ext cx="2743201" cy="660875"/>
+          </a:xfrm>
+          <a:prstGeom prst="roundRect">
+            <a:avLst/>
+          </a:prstGeom>
+          <a:noFill/>
+          <a:ln w="19050">
+            <a:prstDash val="dashDot"/>
+          </a:ln>
+        </p:spPr>
+        <p:style>
+          <a:lnRef idx="2">
+            <a:schemeClr val="accent1">
+              <a:shade val="50000"/>
+            </a:schemeClr>
+          </a:lnRef>
+          <a:fillRef idx="1">
+            <a:schemeClr val="accent1"/>
+          </a:fillRef>
+          <a:effectRef idx="0">
+            <a:schemeClr val="accent1"/>
+          </a:effectRef>
+          <a:fontRef idx="minor">
+            <a:schemeClr val="lt1"/>
+          </a:fontRef>
+        </p:style>
+        <p:txBody>
+          <a:bodyPr rtlCol="0" anchor="ctr"/>
+          <a:lstStyle/>
+          <a:p>
+            <a:pPr algn="ctr"/>
+            <a:endParaRPr lang="en-GB"/>
+          </a:p>
+        </p:txBody>
+      </p:sp>
+      <p:sp>
+        <p:nvSpPr>
+          <p:cNvPr id="7" name="Rectangle: Rounded Corners 6">
+            <a:extLst>
+              <a:ext uri="{FF2B5EF4-FFF2-40B4-BE49-F238E27FC236}">
+                <a16:creationId xmlns:a16="http://schemas.microsoft.com/office/drawing/2014/main" id="{B9160768-E3D0-235E-A7B3-0223218C6813}"/>
+              </a:ext>
+            </a:extLst>
+          </p:cNvPr>
+          <p:cNvSpPr/>
+          <p:nvPr/>
+        </p:nvSpPr>
+        <p:spPr>
+          <a:xfrm>
+            <a:off x="7075714" y="2247253"/>
+            <a:ext cx="4886131" cy="2324747"/>
+          </a:xfrm>
+          <a:prstGeom prst="roundRect">
+            <a:avLst/>
+          </a:prstGeom>
+          <a:noFill/>
+          <a:ln w="19050">
+            <a:prstDash val="dashDot"/>
+          </a:ln>
+        </p:spPr>
+        <p:style>
+          <a:lnRef idx="2">
+            <a:schemeClr val="accent1">
+              <a:shade val="50000"/>
+            </a:schemeClr>
+          </a:lnRef>
+          <a:fillRef idx="1">
+            <a:schemeClr val="accent1"/>
+          </a:fillRef>
+          <a:effectRef idx="0">
+            <a:schemeClr val="accent1"/>
+          </a:effectRef>
+          <a:fontRef idx="minor">
+            <a:schemeClr val="lt1"/>
+          </a:fontRef>
+        </p:style>
+        <p:txBody>
+          <a:bodyPr rtlCol="0" anchor="ctr"/>
+          <a:lstStyle/>
+          <a:p>
+            <a:pPr algn="ctr"/>
+            <a:endParaRPr lang="en-GB"/>
+          </a:p>
+        </p:txBody>
+      </p:sp>
+      <p:sp>
+        <p:nvSpPr>
+          <p:cNvPr id="8" name="Arrow: Curved Right 7">
+            <a:extLst>
+              <a:ext uri="{FF2B5EF4-FFF2-40B4-BE49-F238E27FC236}">
+                <a16:creationId xmlns:a16="http://schemas.microsoft.com/office/drawing/2014/main" id="{99DC8269-5867-BCDF-3F8C-AAFE82B49D21}"/>
+              </a:ext>
+            </a:extLst>
+          </p:cNvPr>
+          <p:cNvSpPr/>
+          <p:nvPr/>
+        </p:nvSpPr>
+        <p:spPr>
+          <a:xfrm rot="20216373">
+            <a:off x="380948" y="3918228"/>
+            <a:ext cx="1347632" cy="2930505"/>
+          </a:xfrm>
+          <a:prstGeom prst="curvedRightArrow">
+            <a:avLst/>
+          </a:prstGeom>
+        </p:spPr>
+        <p:style>
+          <a:lnRef idx="2">
+            <a:schemeClr val="accent1">
+              <a:shade val="50000"/>
+            </a:schemeClr>
+          </a:lnRef>
+          <a:fillRef idx="1">
+            <a:schemeClr val="accent1"/>
+          </a:fillRef>
+          <a:effectRef idx="0">
+            <a:schemeClr val="accent1"/>
+          </a:effectRef>
+          <a:fontRef idx="minor">
+            <a:schemeClr val="lt1"/>
+          </a:fontRef>
+        </p:style>
+        <p:txBody>
+          <a:bodyPr rtlCol="0" anchor="ctr"/>
+          <a:lstStyle/>
+          <a:p>
+            <a:pPr algn="ctr"/>
+            <a:endParaRPr lang="en-GB">
+              <a:solidFill>
+                <a:schemeClr val="tx1"/>
+              </a:solidFill>
+            </a:endParaRPr>
+          </a:p>
+        </p:txBody>
+      </p:sp>
+      <p:sp>
+        <p:nvSpPr>
+          <p:cNvPr id="9" name="Arrow: Curved Up 8">
+            <a:extLst>
+              <a:ext uri="{FF2B5EF4-FFF2-40B4-BE49-F238E27FC236}">
+                <a16:creationId xmlns:a16="http://schemas.microsoft.com/office/drawing/2014/main" id="{A63EAC4D-8FBE-1CFD-935B-49647466A794}"/>
+              </a:ext>
+            </a:extLst>
+          </p:cNvPr>
+          <p:cNvSpPr/>
+          <p:nvPr/>
+        </p:nvSpPr>
+        <p:spPr>
+          <a:xfrm rot="18459184">
+            <a:off x="5442961" y="5213276"/>
+            <a:ext cx="2577458" cy="1276796"/>
+          </a:xfrm>
+          <a:prstGeom prst="curvedUpArrow">
+            <a:avLst/>
+          </a:prstGeom>
+        </p:spPr>
+        <p:style>
+          <a:lnRef idx="2">
+            <a:schemeClr val="accent1">
+              <a:shade val="50000"/>
+            </a:schemeClr>
+          </a:lnRef>
+          <a:fillRef idx="1">
+            <a:schemeClr val="accent1"/>
+          </a:fillRef>
+          <a:effectRef idx="0">
+            <a:schemeClr val="accent1"/>
+          </a:effectRef>
+          <a:fontRef idx="minor">
+            <a:schemeClr val="lt1"/>
+          </a:fontRef>
+        </p:style>
+        <p:txBody>
+          <a:bodyPr rtlCol="0" anchor="ctr"/>
+          <a:lstStyle/>
+          <a:p>
+            <a:pPr algn="ctr"/>
+            <a:endParaRPr lang="en-GB">
+              <a:solidFill>
+                <a:schemeClr val="tx1"/>
+              </a:solidFill>
+            </a:endParaRPr>
+          </a:p>
+        </p:txBody>
+      </p:sp>
+    </p:spTree>
+    <p:extLst>
+      <p:ext uri="{BB962C8B-B14F-4D97-AF65-F5344CB8AC3E}">
+        <p14:creationId xmlns:p14="http://schemas.microsoft.com/office/powerpoint/2010/main" val="2510831529"/>
+      </p:ext>
+    </p:extLst>
+  </p:cSld>
+  <p:clrMapOvr>
+    <a:masterClrMapping/>
+  </p:clrMapOvr>
+</p:sld>
+</file>
+
+<file path=ppt/slides/slide15.xml><?xml version="1.0" encoding="utf-8"?>
+<p:sld xmlns:a="http://schemas.openxmlformats.org/drawingml/2006/main" xmlns:r="http://schemas.openxmlformats.org/officeDocument/2006/relationships" xmlns:p="http://schemas.openxmlformats.org/presentationml/2006/main">
+  <p:cSld>
+    <p:spTree>
+      <p:nvGrpSpPr>
+        <p:cNvPr id="1" name=""/>
+        <p:cNvGrpSpPr/>
+        <p:nvPr/>
+      </p:nvGrpSpPr>
+      <p:grpSpPr>
+        <a:xfrm>
+          <a:off x="0" y="0"/>
+          <a:ext cx="0" cy="0"/>
+          <a:chOff x="0" y="0"/>
+          <a:chExt cx="0" cy="0"/>
+        </a:xfrm>
+      </p:grpSpPr>
+      <p:pic>
+        <p:nvPicPr>
+          <p:cNvPr id="3" name="Picture 2">
+            <a:extLst>
+              <a:ext uri="{FF2B5EF4-FFF2-40B4-BE49-F238E27FC236}">
+                <a16:creationId xmlns:a16="http://schemas.microsoft.com/office/drawing/2014/main" id="{22448A35-E474-F87D-FECE-9FCA8FB728C3}"/>
+              </a:ext>
+            </a:extLst>
+          </p:cNvPr>
+          <p:cNvPicPr>
+            <a:picLocks noChangeAspect="1"/>
+          </p:cNvPicPr>
+          <p:nvPr/>
+        </p:nvPicPr>
+        <p:blipFill>
+          <a:blip r:embed="rId2"/>
+          <a:stretch>
+            <a:fillRect/>
+          </a:stretch>
+        </p:blipFill>
+        <p:spPr>
+          <a:xfrm>
+            <a:off x="1285875" y="1338262"/>
+            <a:ext cx="9620250" cy="4181475"/>
+          </a:xfrm>
+          <a:prstGeom prst="rect">
+            <a:avLst/>
+          </a:prstGeom>
+        </p:spPr>
+      </p:pic>
+    </p:spTree>
+    <p:extLst>
+      <p:ext uri="{BB962C8B-B14F-4D97-AF65-F5344CB8AC3E}">
+        <p14:creationId xmlns:p14="http://schemas.microsoft.com/office/powerpoint/2010/main" val="1711046345"/>
+      </p:ext>
+    </p:extLst>
+  </p:cSld>
+  <p:clrMapOvr>
+    <a:masterClrMapping/>
+  </p:clrMapOvr>
+</p:sld>
+</file>
+
+<file path=ppt/slides/slide16.xml><?xml version="1.0" encoding="utf-8"?>
+<p:sld xmlns:a="http://schemas.openxmlformats.org/drawingml/2006/main" xmlns:r="http://schemas.openxmlformats.org/officeDocument/2006/relationships" xmlns:p="http://schemas.openxmlformats.org/presentationml/2006/main">
+  <p:cSld>
+    <p:spTree>
+      <p:nvGrpSpPr>
+        <p:cNvPr id="1" name=""/>
+        <p:cNvGrpSpPr/>
+        <p:nvPr/>
+      </p:nvGrpSpPr>
+      <p:grpSpPr>
+        <a:xfrm>
+          <a:off x="0" y="0"/>
+          <a:ext cx="0" cy="0"/>
+          <a:chOff x="0" y="0"/>
+          <a:chExt cx="0" cy="0"/>
+        </a:xfrm>
+      </p:grpSpPr>
+      <p:pic>
+        <p:nvPicPr>
+          <p:cNvPr id="3" name="Picture 2">
+            <a:extLst>
+              <a:ext uri="{FF2B5EF4-FFF2-40B4-BE49-F238E27FC236}">
+                <a16:creationId xmlns:a16="http://schemas.microsoft.com/office/drawing/2014/main" id="{7365D391-8032-F6BE-A106-76169F794004}"/>
+              </a:ext>
+            </a:extLst>
+          </p:cNvPr>
+          <p:cNvPicPr>
+            <a:picLocks noChangeAspect="1"/>
+          </p:cNvPicPr>
+          <p:nvPr/>
+        </p:nvPicPr>
+        <p:blipFill>
+          <a:blip r:embed="rId2"/>
+          <a:stretch>
+            <a:fillRect/>
+          </a:stretch>
+        </p:blipFill>
+        <p:spPr>
+          <a:xfrm>
+            <a:off x="3128962" y="695421"/>
+            <a:ext cx="5934075" cy="5000625"/>
+          </a:xfrm>
+          <a:prstGeom prst="rect">
+            <a:avLst/>
+          </a:prstGeom>
+        </p:spPr>
+      </p:pic>
+      <p:sp>
+        <p:nvSpPr>
+          <p:cNvPr id="4" name="Speech Bubble: Oval 3">
+            <a:extLst>
+              <a:ext uri="{FF2B5EF4-FFF2-40B4-BE49-F238E27FC236}">
+                <a16:creationId xmlns:a16="http://schemas.microsoft.com/office/drawing/2014/main" id="{A2B8000F-54D8-A9E3-FDC7-499CC8FC999A}"/>
+              </a:ext>
+            </a:extLst>
+          </p:cNvPr>
+          <p:cNvSpPr/>
+          <p:nvPr/>
+        </p:nvSpPr>
+        <p:spPr>
+          <a:xfrm>
+            <a:off x="-483321" y="1875278"/>
+            <a:ext cx="3346881" cy="410722"/>
+          </a:xfrm>
+          <a:prstGeom prst="wedgeEllipseCallout">
+            <a:avLst>
+              <a:gd name="adj1" fmla="val 74617"/>
+              <a:gd name="adj2" fmla="val 108682"/>
+            </a:avLst>
+          </a:prstGeom>
+        </p:spPr>
+        <p:style>
+          <a:lnRef idx="1">
+            <a:schemeClr val="accent4"/>
+          </a:lnRef>
+          <a:fillRef idx="2">
+            <a:schemeClr val="accent4"/>
+          </a:fillRef>
+          <a:effectRef idx="1">
+            <a:schemeClr val="accent4"/>
+          </a:effectRef>
+          <a:fontRef idx="minor">
+            <a:schemeClr val="dk1"/>
+          </a:fontRef>
+        </p:style>
+        <p:txBody>
+          <a:bodyPr rtlCol="0" anchor="ctr"/>
+          <a:lstStyle/>
+          <a:p>
+            <a:pPr algn="ctr"/>
+            <a:r>
+              <a:rPr lang="en-GB" dirty="0"/>
+              <a:t>GITHUB repo</a:t>
+            </a:r>
+          </a:p>
+        </p:txBody>
+      </p:sp>
+      <p:sp>
+        <p:nvSpPr>
+          <p:cNvPr id="5" name="Speech Bubble: Oval 4">
+            <a:extLst>
+              <a:ext uri="{FF2B5EF4-FFF2-40B4-BE49-F238E27FC236}">
+                <a16:creationId xmlns:a16="http://schemas.microsoft.com/office/drawing/2014/main" id="{B81839F1-9795-498E-54B4-CB864253D484}"/>
+              </a:ext>
+            </a:extLst>
+          </p:cNvPr>
+          <p:cNvSpPr/>
+          <p:nvPr/>
+        </p:nvSpPr>
+        <p:spPr>
+          <a:xfrm>
+            <a:off x="-350620" y="2559523"/>
+            <a:ext cx="3346881" cy="622216"/>
+          </a:xfrm>
+          <a:prstGeom prst="wedgeEllipseCallout">
+            <a:avLst>
+              <a:gd name="adj1" fmla="val 90508"/>
+              <a:gd name="adj2" fmla="val 57696"/>
+            </a:avLst>
+          </a:prstGeom>
+        </p:spPr>
+        <p:style>
+          <a:lnRef idx="1">
+            <a:schemeClr val="accent4"/>
+          </a:lnRef>
+          <a:fillRef idx="2">
+            <a:schemeClr val="accent4"/>
+          </a:fillRef>
+          <a:effectRef idx="1">
+            <a:schemeClr val="accent4"/>
+          </a:effectRef>
+          <a:fontRef idx="minor">
+            <a:schemeClr val="dk1"/>
+          </a:fontRef>
+        </p:style>
+        <p:txBody>
+          <a:bodyPr rtlCol="0" anchor="ctr"/>
+          <a:lstStyle/>
+          <a:p>
+            <a:pPr algn="ctr"/>
+            <a:r>
+              <a:rPr lang="en-GB" dirty="0"/>
+              <a:t>The branch where your files get saved</a:t>
+            </a:r>
+          </a:p>
+        </p:txBody>
+      </p:sp>
+      <p:sp>
+        <p:nvSpPr>
+          <p:cNvPr id="6" name="Speech Bubble: Oval 5">
+            <a:extLst>
+              <a:ext uri="{FF2B5EF4-FFF2-40B4-BE49-F238E27FC236}">
+                <a16:creationId xmlns:a16="http://schemas.microsoft.com/office/drawing/2014/main" id="{D4150203-02EB-4715-D8CD-043850D4AA6F}"/>
+              </a:ext>
+            </a:extLst>
+          </p:cNvPr>
+          <p:cNvSpPr/>
+          <p:nvPr/>
+        </p:nvSpPr>
+        <p:spPr>
+          <a:xfrm>
+            <a:off x="-483321" y="3365154"/>
+            <a:ext cx="3346881" cy="622216"/>
+          </a:xfrm>
+          <a:prstGeom prst="wedgeEllipseCallout">
+            <a:avLst>
+              <a:gd name="adj1" fmla="val 96084"/>
+              <a:gd name="adj2" fmla="val 23206"/>
+            </a:avLst>
+          </a:prstGeom>
+        </p:spPr>
+        <p:style>
+          <a:lnRef idx="1">
+            <a:schemeClr val="accent4"/>
+          </a:lnRef>
+          <a:fillRef idx="2">
+            <a:schemeClr val="accent4"/>
+          </a:fillRef>
+          <a:effectRef idx="1">
+            <a:schemeClr val="accent4"/>
+          </a:effectRef>
+          <a:fontRef idx="minor">
+            <a:schemeClr val="dk1"/>
+          </a:fontRef>
+        </p:style>
+        <p:txBody>
+          <a:bodyPr rtlCol="0" anchor="ctr"/>
+          <a:lstStyle/>
+          <a:p>
+            <a:pPr algn="ctr"/>
+            <a:r>
+              <a:rPr lang="en-GB" dirty="0"/>
+              <a:t>The branch where files get merged</a:t>
+            </a:r>
+          </a:p>
+        </p:txBody>
+      </p:sp>
+    </p:spTree>
+    <p:extLst>
+      <p:ext uri="{BB962C8B-B14F-4D97-AF65-F5344CB8AC3E}">
+        <p14:creationId xmlns:p14="http://schemas.microsoft.com/office/powerpoint/2010/main" val="3108674709"/>
+      </p:ext>
+    </p:extLst>
+  </p:cSld>
+  <p:clrMapOvr>
+    <a:masterClrMapping/>
+  </p:clrMapOvr>
+</p:sld>
+</file>
+
+<file path=ppt/slides/slide17.xml><?xml version="1.0" encoding="utf-8"?>
+<p:sld xmlns:a="http://schemas.openxmlformats.org/drawingml/2006/main" xmlns:r="http://schemas.openxmlformats.org/officeDocument/2006/relationships" xmlns:p="http://schemas.openxmlformats.org/presentationml/2006/main">
+  <p:cSld>
+    <p:spTree>
+      <p:nvGrpSpPr>
+        <p:cNvPr id="1" name=""/>
+        <p:cNvGrpSpPr/>
+        <p:nvPr/>
+      </p:nvGrpSpPr>
+      <p:grpSpPr>
+        <a:xfrm>
+          <a:off x="0" y="0"/>
+          <a:ext cx="0" cy="0"/>
+          <a:chOff x="0" y="0"/>
+          <a:chExt cx="0" cy="0"/>
+        </a:xfrm>
+      </p:grpSpPr>
+      <p:pic>
+        <p:nvPicPr>
+          <p:cNvPr id="6" name="Picture 5">
+            <a:extLst>
+              <a:ext uri="{FF2B5EF4-FFF2-40B4-BE49-F238E27FC236}">
+                <a16:creationId xmlns:a16="http://schemas.microsoft.com/office/drawing/2014/main" id="{22DC876A-ECA1-DE01-E940-10D5DD5BDA72}"/>
+              </a:ext>
+            </a:extLst>
+          </p:cNvPr>
+          <p:cNvPicPr>
+            <a:picLocks noChangeAspect="1"/>
+          </p:cNvPicPr>
+          <p:nvPr/>
+        </p:nvPicPr>
+        <p:blipFill>
+          <a:blip r:embed="rId2"/>
+          <a:stretch>
+            <a:fillRect/>
+          </a:stretch>
+        </p:blipFill>
+        <p:spPr>
+          <a:xfrm>
+            <a:off x="1939212" y="1311631"/>
+            <a:ext cx="7772400" cy="3133725"/>
+          </a:xfrm>
+          <a:prstGeom prst="rect">
+            <a:avLst/>
+          </a:prstGeom>
+        </p:spPr>
+      </p:pic>
+      <p:sp>
+        <p:nvSpPr>
+          <p:cNvPr id="4" name="TextBox 3">
+            <a:extLst>
+              <a:ext uri="{FF2B5EF4-FFF2-40B4-BE49-F238E27FC236}">
+                <a16:creationId xmlns:a16="http://schemas.microsoft.com/office/drawing/2014/main" id="{1A0FB935-D329-AEA4-CE18-12F952D9E8B4}"/>
+              </a:ext>
+            </a:extLst>
+          </p:cNvPr>
+          <p:cNvSpPr txBox="1"/>
+          <p:nvPr/>
+        </p:nvSpPr>
+        <p:spPr>
+          <a:xfrm>
+            <a:off x="3817360" y="1667941"/>
+            <a:ext cx="3227252" cy="369332"/>
+          </a:xfrm>
+          <a:prstGeom prst="rect">
+            <a:avLst/>
+          </a:prstGeom>
+          <a:noFill/>
+          <a:ln w="28575">
+            <a:solidFill>
+              <a:schemeClr val="accent1">
+                <a:shade val="50000"/>
+              </a:schemeClr>
+            </a:solidFill>
+          </a:ln>
+        </p:spPr>
+        <p:txBody>
+          <a:bodyPr wrap="square" rtlCol="0">
+            <a:spAutoFit/>
+          </a:bodyPr>
+          <a:lstStyle/>
+          <a:p>
+            <a:endParaRPr lang="en-GB" dirty="0"/>
+          </a:p>
+        </p:txBody>
+      </p:sp>
+      <p:sp>
+        <p:nvSpPr>
+          <p:cNvPr id="7" name="Speech Bubble: Oval 6">
+            <a:extLst>
+              <a:ext uri="{FF2B5EF4-FFF2-40B4-BE49-F238E27FC236}">
+                <a16:creationId xmlns:a16="http://schemas.microsoft.com/office/drawing/2014/main" id="{681B93A6-66A1-E107-BEB0-20CADD64F9B1}"/>
+              </a:ext>
+            </a:extLst>
+          </p:cNvPr>
+          <p:cNvSpPr/>
+          <p:nvPr/>
+        </p:nvSpPr>
+        <p:spPr>
+          <a:xfrm>
+            <a:off x="151161" y="335902"/>
+            <a:ext cx="6333615" cy="578498"/>
+          </a:xfrm>
+          <a:prstGeom prst="wedgeEllipseCallout">
+            <a:avLst>
+              <a:gd name="adj1" fmla="val 42264"/>
+              <a:gd name="adj2" fmla="val 221657"/>
+            </a:avLst>
+          </a:prstGeom>
+        </p:spPr>
+        <p:style>
+          <a:lnRef idx="1">
+            <a:schemeClr val="accent4"/>
+          </a:lnRef>
+          <a:fillRef idx="2">
+            <a:schemeClr val="accent4"/>
+          </a:fillRef>
+          <a:effectRef idx="1">
+            <a:schemeClr val="accent4"/>
+          </a:effectRef>
+          <a:fontRef idx="minor">
+            <a:schemeClr val="dk1"/>
+          </a:fontRef>
+        </p:style>
+        <p:txBody>
+          <a:bodyPr rtlCol="0" anchor="ctr"/>
+          <a:lstStyle/>
+          <a:p>
+            <a:pPr algn="ctr"/>
+            <a:r>
+              <a:rPr lang="en-GB" dirty="0" err="1"/>
+              <a:t>Synpapse</a:t>
+            </a:r>
+            <a:r>
+              <a:rPr lang="en-GB" dirty="0"/>
+              <a:t> script editor is now wired up to the collaboration branch</a:t>
+            </a:r>
+          </a:p>
+        </p:txBody>
+      </p:sp>
+    </p:spTree>
+    <p:extLst>
+      <p:ext uri="{BB962C8B-B14F-4D97-AF65-F5344CB8AC3E}">
+        <p14:creationId xmlns:p14="http://schemas.microsoft.com/office/powerpoint/2010/main" val="1822885500"/>
       </p:ext>
     </p:extLst>
   </p:cSld>

</xml_diff>

<commit_message>
Completed What does GIT integration look like
</commit_message>
<xml_diff>
--- a/synapse-sqlviews-integrationtesting/docs/Synapse-Presentation1.pptx
+++ b/synapse-sqlviews-integrationtesting/docs/Synapse-Presentation1.pptx
@@ -5,7 +5,7 @@
     <p:sldMasterId id="2147483648" r:id="rId1"/>
   </p:sldMasterIdLst>
   <p:notesMasterIdLst>
-    <p:notesMasterId r:id="rId19"/>
+    <p:notesMasterId r:id="rId23"/>
   </p:notesMasterIdLst>
   <p:sldIdLst>
     <p:sldId id="256" r:id="rId2"/>
@@ -25,6 +25,10 @@
     <p:sldId id="270" r:id="rId16"/>
     <p:sldId id="271" r:id="rId17"/>
     <p:sldId id="272" r:id="rId18"/>
+    <p:sldId id="273" r:id="rId19"/>
+    <p:sldId id="274" r:id="rId20"/>
+    <p:sldId id="275" r:id="rId21"/>
+    <p:sldId id="276" r:id="rId22"/>
   </p:sldIdLst>
   <p:sldSz cx="12192000" cy="6858000"/>
   <p:notesSz cx="6858000" cy="9144000"/>
@@ -213,7 +217,7 @@
           <a:p>
             <a:fld id="{88BBF65C-509D-444C-B06A-3481FFEB325E}" type="datetimeFigureOut">
               <a:rPr lang="en-GB" smtClean="0"/>
-              <a:t>01/08/2022</a:t>
+              <a:t>02/08/2022</a:t>
             </a:fld>
             <a:endParaRPr lang="en-GB"/>
           </a:p>
@@ -914,7 +918,7 @@
           <a:p>
             <a:fld id="{FC05764E-BF05-4ADF-9C0D-E7E7BE4B37C6}" type="datetimeFigureOut">
               <a:rPr lang="en-GB" smtClean="0"/>
-              <a:t>01/08/2022</a:t>
+              <a:t>02/08/2022</a:t>
             </a:fld>
             <a:endParaRPr lang="en-GB"/>
           </a:p>
@@ -1114,7 +1118,7 @@
           <a:p>
             <a:fld id="{FC05764E-BF05-4ADF-9C0D-E7E7BE4B37C6}" type="datetimeFigureOut">
               <a:rPr lang="en-GB" smtClean="0"/>
-              <a:t>01/08/2022</a:t>
+              <a:t>02/08/2022</a:t>
             </a:fld>
             <a:endParaRPr lang="en-GB"/>
           </a:p>
@@ -1324,7 +1328,7 @@
           <a:p>
             <a:fld id="{FC05764E-BF05-4ADF-9C0D-E7E7BE4B37C6}" type="datetimeFigureOut">
               <a:rPr lang="en-GB" smtClean="0"/>
-              <a:t>01/08/2022</a:t>
+              <a:t>02/08/2022</a:t>
             </a:fld>
             <a:endParaRPr lang="en-GB"/>
           </a:p>
@@ -1524,7 +1528,7 @@
           <a:p>
             <a:fld id="{FC05764E-BF05-4ADF-9C0D-E7E7BE4B37C6}" type="datetimeFigureOut">
               <a:rPr lang="en-GB" smtClean="0"/>
-              <a:t>01/08/2022</a:t>
+              <a:t>02/08/2022</a:t>
             </a:fld>
             <a:endParaRPr lang="en-GB"/>
           </a:p>
@@ -1800,7 +1804,7 @@
           <a:p>
             <a:fld id="{FC05764E-BF05-4ADF-9C0D-E7E7BE4B37C6}" type="datetimeFigureOut">
               <a:rPr lang="en-GB" smtClean="0"/>
-              <a:t>01/08/2022</a:t>
+              <a:t>02/08/2022</a:t>
             </a:fld>
             <a:endParaRPr lang="en-GB"/>
           </a:p>
@@ -2068,7 +2072,7 @@
           <a:p>
             <a:fld id="{FC05764E-BF05-4ADF-9C0D-E7E7BE4B37C6}" type="datetimeFigureOut">
               <a:rPr lang="en-GB" smtClean="0"/>
-              <a:t>01/08/2022</a:t>
+              <a:t>02/08/2022</a:t>
             </a:fld>
             <a:endParaRPr lang="en-GB"/>
           </a:p>
@@ -2483,7 +2487,7 @@
           <a:p>
             <a:fld id="{FC05764E-BF05-4ADF-9C0D-E7E7BE4B37C6}" type="datetimeFigureOut">
               <a:rPr lang="en-GB" smtClean="0"/>
-              <a:t>01/08/2022</a:t>
+              <a:t>02/08/2022</a:t>
             </a:fld>
             <a:endParaRPr lang="en-GB"/>
           </a:p>
@@ -2625,7 +2629,7 @@
           <a:p>
             <a:fld id="{FC05764E-BF05-4ADF-9C0D-E7E7BE4B37C6}" type="datetimeFigureOut">
               <a:rPr lang="en-GB" smtClean="0"/>
-              <a:t>01/08/2022</a:t>
+              <a:t>02/08/2022</a:t>
             </a:fld>
             <a:endParaRPr lang="en-GB"/>
           </a:p>
@@ -2738,7 +2742,7 @@
           <a:p>
             <a:fld id="{FC05764E-BF05-4ADF-9C0D-E7E7BE4B37C6}" type="datetimeFigureOut">
               <a:rPr lang="en-GB" smtClean="0"/>
-              <a:t>01/08/2022</a:t>
+              <a:t>02/08/2022</a:t>
             </a:fld>
             <a:endParaRPr lang="en-GB"/>
           </a:p>
@@ -3051,7 +3055,7 @@
           <a:p>
             <a:fld id="{FC05764E-BF05-4ADF-9C0D-E7E7BE4B37C6}" type="datetimeFigureOut">
               <a:rPr lang="en-GB" smtClean="0"/>
-              <a:t>01/08/2022</a:t>
+              <a:t>02/08/2022</a:t>
             </a:fld>
             <a:endParaRPr lang="en-GB"/>
           </a:p>
@@ -3340,7 +3344,7 @@
           <a:p>
             <a:fld id="{FC05764E-BF05-4ADF-9C0D-E7E7BE4B37C6}" type="datetimeFigureOut">
               <a:rPr lang="en-GB" smtClean="0"/>
-              <a:t>01/08/2022</a:t>
+              <a:t>02/08/2022</a:t>
             </a:fld>
             <a:endParaRPr lang="en-GB"/>
           </a:p>
@@ -3583,7 +3587,7 @@
           <a:p>
             <a:fld id="{FC05764E-BF05-4ADF-9C0D-E7E7BE4B37C6}" type="datetimeFigureOut">
               <a:rPr lang="en-GB" smtClean="0"/>
-              <a:t>01/08/2022</a:t>
+              <a:t>02/08/2022</a:t>
             </a:fld>
             <a:endParaRPr lang="en-GB"/>
           </a:p>
@@ -6183,6 +6187,567 @@
 </p:sld>
 </file>
 
+<file path=ppt/slides/slide18.xml><?xml version="1.0" encoding="utf-8"?>
+<p:sld xmlns:a="http://schemas.openxmlformats.org/drawingml/2006/main" xmlns:r="http://schemas.openxmlformats.org/officeDocument/2006/relationships" xmlns:p="http://schemas.openxmlformats.org/presentationml/2006/main">
+  <p:cSld>
+    <p:spTree>
+      <p:nvGrpSpPr>
+        <p:cNvPr id="1" name=""/>
+        <p:cNvGrpSpPr/>
+        <p:nvPr/>
+      </p:nvGrpSpPr>
+      <p:grpSpPr>
+        <a:xfrm>
+          <a:off x="0" y="0"/>
+          <a:ext cx="0" cy="0"/>
+          <a:chOff x="0" y="0"/>
+          <a:chExt cx="0" cy="0"/>
+        </a:xfrm>
+      </p:grpSpPr>
+      <p:pic>
+        <p:nvPicPr>
+          <p:cNvPr id="5" name="Picture 4">
+            <a:extLst>
+              <a:ext uri="{FF2B5EF4-FFF2-40B4-BE49-F238E27FC236}">
+                <a16:creationId xmlns:a16="http://schemas.microsoft.com/office/drawing/2014/main" id="{B1C6EC64-373C-E65E-783F-D88AF2845F78}"/>
+              </a:ext>
+            </a:extLst>
+          </p:cNvPr>
+          <p:cNvPicPr>
+            <a:picLocks noChangeAspect="1"/>
+          </p:cNvPicPr>
+          <p:nvPr/>
+        </p:nvPicPr>
+        <p:blipFill>
+          <a:blip r:embed="rId2"/>
+          <a:stretch>
+            <a:fillRect/>
+          </a:stretch>
+        </p:blipFill>
+        <p:spPr>
+          <a:xfrm>
+            <a:off x="375362" y="544188"/>
+            <a:ext cx="4667250" cy="1533525"/>
+          </a:xfrm>
+          <a:prstGeom prst="rect">
+            <a:avLst/>
+          </a:prstGeom>
+        </p:spPr>
+      </p:pic>
+      <p:sp>
+        <p:nvSpPr>
+          <p:cNvPr id="6" name="TextBox 5">
+            <a:extLst>
+              <a:ext uri="{FF2B5EF4-FFF2-40B4-BE49-F238E27FC236}">
+                <a16:creationId xmlns:a16="http://schemas.microsoft.com/office/drawing/2014/main" id="{3E86E6D2-605B-8D83-4A4C-8A3153B64331}"/>
+              </a:ext>
+            </a:extLst>
+          </p:cNvPr>
+          <p:cNvSpPr txBox="1"/>
+          <p:nvPr/>
+        </p:nvSpPr>
+        <p:spPr>
+          <a:xfrm>
+            <a:off x="234404" y="544188"/>
+            <a:ext cx="3227252" cy="369332"/>
+          </a:xfrm>
+          <a:prstGeom prst="rect">
+            <a:avLst/>
+          </a:prstGeom>
+          <a:noFill/>
+          <a:ln w="28575">
+            <a:solidFill>
+              <a:schemeClr val="accent1">
+                <a:shade val="50000"/>
+              </a:schemeClr>
+            </a:solidFill>
+          </a:ln>
+        </p:spPr>
+        <p:txBody>
+          <a:bodyPr wrap="square" rtlCol="0">
+            <a:spAutoFit/>
+          </a:bodyPr>
+          <a:lstStyle/>
+          <a:p>
+            <a:endParaRPr lang="en-GB" dirty="0"/>
+          </a:p>
+        </p:txBody>
+      </p:sp>
+      <p:sp>
+        <p:nvSpPr>
+          <p:cNvPr id="7" name="TextBox 6">
+            <a:extLst>
+              <a:ext uri="{FF2B5EF4-FFF2-40B4-BE49-F238E27FC236}">
+                <a16:creationId xmlns:a16="http://schemas.microsoft.com/office/drawing/2014/main" id="{D3D619FF-8CC3-813C-49F3-70EC19119019}"/>
+              </a:ext>
+            </a:extLst>
+          </p:cNvPr>
+          <p:cNvSpPr txBox="1"/>
+          <p:nvPr/>
+        </p:nvSpPr>
+        <p:spPr>
+          <a:xfrm>
+            <a:off x="2504853" y="1219103"/>
+            <a:ext cx="2537759" cy="369332"/>
+          </a:xfrm>
+          <a:prstGeom prst="rect">
+            <a:avLst/>
+          </a:prstGeom>
+          <a:noFill/>
+          <a:ln w="28575">
+            <a:solidFill>
+              <a:schemeClr val="accent1">
+                <a:shade val="50000"/>
+              </a:schemeClr>
+            </a:solidFill>
+          </a:ln>
+        </p:spPr>
+        <p:txBody>
+          <a:bodyPr wrap="square" rtlCol="0">
+            <a:spAutoFit/>
+          </a:bodyPr>
+          <a:lstStyle/>
+          <a:p>
+            <a:endParaRPr lang="en-GB" dirty="0"/>
+          </a:p>
+        </p:txBody>
+      </p:sp>
+      <p:sp>
+        <p:nvSpPr>
+          <p:cNvPr id="12" name="Arrow: Down 11">
+            <a:extLst>
+              <a:ext uri="{FF2B5EF4-FFF2-40B4-BE49-F238E27FC236}">
+                <a16:creationId xmlns:a16="http://schemas.microsoft.com/office/drawing/2014/main" id="{AFE18EC2-E166-8FA4-A7E5-CFA62D58FF59}"/>
+              </a:ext>
+            </a:extLst>
+          </p:cNvPr>
+          <p:cNvSpPr/>
+          <p:nvPr/>
+        </p:nvSpPr>
+        <p:spPr>
+          <a:xfrm>
+            <a:off x="5705382" y="1982108"/>
+            <a:ext cx="781235" cy="1071978"/>
+          </a:xfrm>
+          <a:prstGeom prst="downArrow">
+            <a:avLst/>
+          </a:prstGeom>
+        </p:spPr>
+        <p:style>
+          <a:lnRef idx="2">
+            <a:schemeClr val="accent1">
+              <a:shade val="50000"/>
+            </a:schemeClr>
+          </a:lnRef>
+          <a:fillRef idx="1">
+            <a:schemeClr val="accent1"/>
+          </a:fillRef>
+          <a:effectRef idx="0">
+            <a:schemeClr val="accent1"/>
+          </a:effectRef>
+          <a:fontRef idx="minor">
+            <a:schemeClr val="lt1"/>
+          </a:fontRef>
+        </p:style>
+        <p:txBody>
+          <a:bodyPr rtlCol="0" anchor="ctr"/>
+          <a:lstStyle/>
+          <a:p>
+            <a:pPr algn="ctr"/>
+            <a:endParaRPr lang="en-GB" b="1" dirty="0"/>
+          </a:p>
+        </p:txBody>
+      </p:sp>
+      <p:pic>
+        <p:nvPicPr>
+          <p:cNvPr id="14" name="Picture 13">
+            <a:extLst>
+              <a:ext uri="{FF2B5EF4-FFF2-40B4-BE49-F238E27FC236}">
+                <a16:creationId xmlns:a16="http://schemas.microsoft.com/office/drawing/2014/main" id="{8EB9504C-F7F0-02E4-CD6E-2E54ECE4911C}"/>
+              </a:ext>
+            </a:extLst>
+          </p:cNvPr>
+          <p:cNvPicPr>
+            <a:picLocks noChangeAspect="1"/>
+          </p:cNvPicPr>
+          <p:nvPr/>
+        </p:nvPicPr>
+        <p:blipFill>
+          <a:blip r:embed="rId3"/>
+          <a:stretch>
+            <a:fillRect/>
+          </a:stretch>
+        </p:blipFill>
+        <p:spPr>
+          <a:xfrm>
+            <a:off x="2601977" y="3465837"/>
+            <a:ext cx="6372225" cy="2847975"/>
+          </a:xfrm>
+          <a:prstGeom prst="rect">
+            <a:avLst/>
+          </a:prstGeom>
+        </p:spPr>
+      </p:pic>
+      <p:sp>
+        <p:nvSpPr>
+          <p:cNvPr id="15" name="TextBox 14">
+            <a:extLst>
+              <a:ext uri="{FF2B5EF4-FFF2-40B4-BE49-F238E27FC236}">
+                <a16:creationId xmlns:a16="http://schemas.microsoft.com/office/drawing/2014/main" id="{375862C2-BB88-0A71-344F-128C3064C70F}"/>
+              </a:ext>
+            </a:extLst>
+          </p:cNvPr>
+          <p:cNvSpPr txBox="1"/>
+          <p:nvPr/>
+        </p:nvSpPr>
+        <p:spPr>
+          <a:xfrm>
+            <a:off x="4436502" y="3394150"/>
+            <a:ext cx="2537759" cy="369332"/>
+          </a:xfrm>
+          <a:prstGeom prst="rect">
+            <a:avLst/>
+          </a:prstGeom>
+          <a:noFill/>
+          <a:ln w="28575">
+            <a:solidFill>
+              <a:schemeClr val="accent1">
+                <a:shade val="50000"/>
+              </a:schemeClr>
+            </a:solidFill>
+          </a:ln>
+        </p:spPr>
+        <p:txBody>
+          <a:bodyPr wrap="square" rtlCol="0">
+            <a:spAutoFit/>
+          </a:bodyPr>
+          <a:lstStyle/>
+          <a:p>
+            <a:endParaRPr lang="en-GB" dirty="0"/>
+          </a:p>
+        </p:txBody>
+      </p:sp>
+      <p:sp>
+        <p:nvSpPr>
+          <p:cNvPr id="16" name="Speech Bubble: Oval 15">
+            <a:extLst>
+              <a:ext uri="{FF2B5EF4-FFF2-40B4-BE49-F238E27FC236}">
+                <a16:creationId xmlns:a16="http://schemas.microsoft.com/office/drawing/2014/main" id="{C877DF5A-7086-BC02-9756-8A66251C10EA}"/>
+              </a:ext>
+            </a:extLst>
+          </p:cNvPr>
+          <p:cNvSpPr/>
+          <p:nvPr/>
+        </p:nvSpPr>
+        <p:spPr>
+          <a:xfrm>
+            <a:off x="5563538" y="335022"/>
+            <a:ext cx="6333615" cy="578498"/>
+          </a:xfrm>
+          <a:prstGeom prst="wedgeEllipseCallout">
+            <a:avLst>
+              <a:gd name="adj1" fmla="val -83694"/>
+              <a:gd name="adj2" fmla="val 147463"/>
+            </a:avLst>
+          </a:prstGeom>
+        </p:spPr>
+        <p:style>
+          <a:lnRef idx="1">
+            <a:schemeClr val="accent4"/>
+          </a:lnRef>
+          <a:fillRef idx="2">
+            <a:schemeClr val="accent4"/>
+          </a:fillRef>
+          <a:effectRef idx="1">
+            <a:schemeClr val="accent4"/>
+          </a:effectRef>
+          <a:fontRef idx="minor">
+            <a:schemeClr val="dk1"/>
+          </a:fontRef>
+        </p:style>
+        <p:txBody>
+          <a:bodyPr rtlCol="0" anchor="ctr"/>
+          <a:lstStyle/>
+          <a:p>
+            <a:pPr algn="ctr"/>
+            <a:r>
+              <a:rPr lang="en-GB" dirty="0"/>
+              <a:t>Create a new SQL script</a:t>
+            </a:r>
+          </a:p>
+        </p:txBody>
+      </p:sp>
+      <p:sp>
+        <p:nvSpPr>
+          <p:cNvPr id="17" name="Speech Bubble: Oval 16">
+            <a:extLst>
+              <a:ext uri="{FF2B5EF4-FFF2-40B4-BE49-F238E27FC236}">
+                <a16:creationId xmlns:a16="http://schemas.microsoft.com/office/drawing/2014/main" id="{8A6553C5-D689-3BAC-0154-10C057E4A359}"/>
+              </a:ext>
+            </a:extLst>
+          </p:cNvPr>
+          <p:cNvSpPr/>
+          <p:nvPr/>
+        </p:nvSpPr>
+        <p:spPr>
+          <a:xfrm>
+            <a:off x="-770077" y="2423844"/>
+            <a:ext cx="6333615" cy="578498"/>
+          </a:xfrm>
+          <a:prstGeom prst="wedgeEllipseCallout">
+            <a:avLst>
+              <a:gd name="adj1" fmla="val 14273"/>
+              <a:gd name="adj2" fmla="val 539399"/>
+            </a:avLst>
+          </a:prstGeom>
+        </p:spPr>
+        <p:style>
+          <a:lnRef idx="1">
+            <a:schemeClr val="accent4"/>
+          </a:lnRef>
+          <a:fillRef idx="2">
+            <a:schemeClr val="accent4"/>
+          </a:fillRef>
+          <a:effectRef idx="1">
+            <a:schemeClr val="accent4"/>
+          </a:effectRef>
+          <a:fontRef idx="minor">
+            <a:schemeClr val="dk1"/>
+          </a:fontRef>
+        </p:style>
+        <p:txBody>
+          <a:bodyPr rtlCol="0" anchor="ctr"/>
+          <a:lstStyle/>
+          <a:p>
+            <a:pPr algn="ctr"/>
+            <a:r>
+              <a:rPr lang="en-GB" dirty="0"/>
+              <a:t>Write a simple SQL query to read the CSV file and press </a:t>
+            </a:r>
+            <a:r>
+              <a:rPr lang="en-GB" b="1" dirty="0"/>
+              <a:t>Publish </a:t>
+            </a:r>
+            <a:r>
+              <a:rPr lang="en-GB" dirty="0"/>
+              <a:t>button</a:t>
+            </a:r>
+            <a:endParaRPr lang="en-GB" b="1" dirty="0"/>
+          </a:p>
+        </p:txBody>
+      </p:sp>
+    </p:spTree>
+    <p:extLst>
+      <p:ext uri="{BB962C8B-B14F-4D97-AF65-F5344CB8AC3E}">
+        <p14:creationId xmlns:p14="http://schemas.microsoft.com/office/powerpoint/2010/main" val="1034719246"/>
+      </p:ext>
+    </p:extLst>
+  </p:cSld>
+  <p:clrMapOvr>
+    <a:masterClrMapping/>
+  </p:clrMapOvr>
+</p:sld>
+</file>
+
+<file path=ppt/slides/slide19.xml><?xml version="1.0" encoding="utf-8"?>
+<p:sld xmlns:a="http://schemas.openxmlformats.org/drawingml/2006/main" xmlns:r="http://schemas.openxmlformats.org/officeDocument/2006/relationships" xmlns:p="http://schemas.openxmlformats.org/presentationml/2006/main">
+  <p:cSld>
+    <p:spTree>
+      <p:nvGrpSpPr>
+        <p:cNvPr id="1" name=""/>
+        <p:cNvGrpSpPr/>
+        <p:nvPr/>
+      </p:nvGrpSpPr>
+      <p:grpSpPr>
+        <a:xfrm>
+          <a:off x="0" y="0"/>
+          <a:ext cx="0" cy="0"/>
+          <a:chOff x="0" y="0"/>
+          <a:chExt cx="0" cy="0"/>
+        </a:xfrm>
+      </p:grpSpPr>
+      <p:pic>
+        <p:nvPicPr>
+          <p:cNvPr id="3" name="Picture 2">
+            <a:extLst>
+              <a:ext uri="{FF2B5EF4-FFF2-40B4-BE49-F238E27FC236}">
+                <a16:creationId xmlns:a16="http://schemas.microsoft.com/office/drawing/2014/main" id="{D7D724DE-E04E-AE7B-AF21-7AC3055B4423}"/>
+              </a:ext>
+            </a:extLst>
+          </p:cNvPr>
+          <p:cNvPicPr>
+            <a:picLocks noChangeAspect="1"/>
+          </p:cNvPicPr>
+          <p:nvPr/>
+        </p:nvPicPr>
+        <p:blipFill>
+          <a:blip r:embed="rId2"/>
+          <a:stretch>
+            <a:fillRect/>
+          </a:stretch>
+        </p:blipFill>
+        <p:spPr>
+          <a:xfrm>
+            <a:off x="2143125" y="1666875"/>
+            <a:ext cx="7905750" cy="3524250"/>
+          </a:xfrm>
+          <a:prstGeom prst="rect">
+            <a:avLst/>
+          </a:prstGeom>
+        </p:spPr>
+      </p:pic>
+      <p:sp>
+        <p:nvSpPr>
+          <p:cNvPr id="4" name="Arrow: Down 3">
+            <a:extLst>
+              <a:ext uri="{FF2B5EF4-FFF2-40B4-BE49-F238E27FC236}">
+                <a16:creationId xmlns:a16="http://schemas.microsoft.com/office/drawing/2014/main" id="{CB54D65D-A18E-A1E9-19A1-948E1B397135}"/>
+              </a:ext>
+            </a:extLst>
+          </p:cNvPr>
+          <p:cNvSpPr/>
+          <p:nvPr/>
+        </p:nvSpPr>
+        <p:spPr>
+          <a:xfrm>
+            <a:off x="5661838" y="5490757"/>
+            <a:ext cx="781235" cy="1071978"/>
+          </a:xfrm>
+          <a:prstGeom prst="downArrow">
+            <a:avLst/>
+          </a:prstGeom>
+        </p:spPr>
+        <p:style>
+          <a:lnRef idx="2">
+            <a:schemeClr val="accent1">
+              <a:shade val="50000"/>
+            </a:schemeClr>
+          </a:lnRef>
+          <a:fillRef idx="1">
+            <a:schemeClr val="accent1"/>
+          </a:fillRef>
+          <a:effectRef idx="0">
+            <a:schemeClr val="accent1"/>
+          </a:effectRef>
+          <a:fontRef idx="minor">
+            <a:schemeClr val="lt1"/>
+          </a:fontRef>
+        </p:style>
+        <p:txBody>
+          <a:bodyPr rtlCol="0" anchor="ctr"/>
+          <a:lstStyle/>
+          <a:p>
+            <a:pPr algn="ctr"/>
+            <a:endParaRPr lang="en-GB" b="1" dirty="0"/>
+          </a:p>
+        </p:txBody>
+      </p:sp>
+      <p:sp>
+        <p:nvSpPr>
+          <p:cNvPr id="5" name="TextBox 4">
+            <a:extLst>
+              <a:ext uri="{FF2B5EF4-FFF2-40B4-BE49-F238E27FC236}">
+                <a16:creationId xmlns:a16="http://schemas.microsoft.com/office/drawing/2014/main" id="{5F3F79A1-D8C9-1A67-B587-C36153D5DD27}"/>
+              </a:ext>
+            </a:extLst>
+          </p:cNvPr>
+          <p:cNvSpPr txBox="1"/>
+          <p:nvPr/>
+        </p:nvSpPr>
+        <p:spPr>
+          <a:xfrm>
+            <a:off x="2365106" y="4786943"/>
+            <a:ext cx="2537759" cy="369332"/>
+          </a:xfrm>
+          <a:prstGeom prst="rect">
+            <a:avLst/>
+          </a:prstGeom>
+          <a:noFill/>
+          <a:ln w="28575">
+            <a:solidFill>
+              <a:schemeClr val="accent1">
+                <a:shade val="50000"/>
+              </a:schemeClr>
+            </a:solidFill>
+          </a:ln>
+        </p:spPr>
+        <p:txBody>
+          <a:bodyPr wrap="square" rtlCol="0">
+            <a:spAutoFit/>
+          </a:bodyPr>
+          <a:lstStyle/>
+          <a:p>
+            <a:endParaRPr lang="en-GB" dirty="0"/>
+          </a:p>
+        </p:txBody>
+      </p:sp>
+      <p:sp>
+        <p:nvSpPr>
+          <p:cNvPr id="6" name="Speech Bubble: Oval 5">
+            <a:extLst>
+              <a:ext uri="{FF2B5EF4-FFF2-40B4-BE49-F238E27FC236}">
+                <a16:creationId xmlns:a16="http://schemas.microsoft.com/office/drawing/2014/main" id="{76E5A943-9673-21C6-5DCF-166C1BF726A8}"/>
+              </a:ext>
+            </a:extLst>
+          </p:cNvPr>
+          <p:cNvSpPr/>
+          <p:nvPr/>
+        </p:nvSpPr>
+        <p:spPr>
+          <a:xfrm>
+            <a:off x="4807137" y="313926"/>
+            <a:ext cx="6333615" cy="578498"/>
+          </a:xfrm>
+          <a:prstGeom prst="wedgeEllipseCallout">
+            <a:avLst>
+              <a:gd name="adj1" fmla="val -55850"/>
+              <a:gd name="adj2" fmla="val 757141"/>
+            </a:avLst>
+          </a:prstGeom>
+        </p:spPr>
+        <p:style>
+          <a:lnRef idx="1">
+            <a:schemeClr val="accent4"/>
+          </a:lnRef>
+          <a:fillRef idx="2">
+            <a:schemeClr val="accent4"/>
+          </a:fillRef>
+          <a:effectRef idx="1">
+            <a:schemeClr val="accent4"/>
+          </a:effectRef>
+          <a:fontRef idx="minor">
+            <a:schemeClr val="dk1"/>
+          </a:fontRef>
+        </p:style>
+        <p:txBody>
+          <a:bodyPr rtlCol="0" anchor="ctr"/>
+          <a:lstStyle/>
+          <a:p>
+            <a:pPr algn="ctr"/>
+            <a:r>
+              <a:rPr lang="en-GB" dirty="0"/>
+              <a:t>Head over to Github and you will notice that the same file is now saved to </a:t>
+            </a:r>
+            <a:r>
+              <a:rPr lang="en-GB" b="1" dirty="0"/>
+              <a:t>GIT</a:t>
+            </a:r>
+          </a:p>
+        </p:txBody>
+      </p:sp>
+    </p:spTree>
+    <p:extLst>
+      <p:ext uri="{BB962C8B-B14F-4D97-AF65-F5344CB8AC3E}">
+        <p14:creationId xmlns:p14="http://schemas.microsoft.com/office/powerpoint/2010/main" val="76131097"/>
+      </p:ext>
+    </p:extLst>
+  </p:cSld>
+  <p:clrMapOvr>
+    <a:masterClrMapping/>
+  </p:clrMapOvr>
+</p:sld>
+</file>
+
 <file path=ppt/slides/slide2.xml><?xml version="1.0" encoding="utf-8"?>
 <p:sld xmlns:a="http://schemas.openxmlformats.org/drawingml/2006/main" xmlns:r="http://schemas.openxmlformats.org/officeDocument/2006/relationships" xmlns:p="http://schemas.openxmlformats.org/presentationml/2006/main">
   <p:cSld>
@@ -6390,6 +6955,351 @@
     <p:extLst>
       <p:ext uri="{BB962C8B-B14F-4D97-AF65-F5344CB8AC3E}">
         <p14:creationId xmlns:p14="http://schemas.microsoft.com/office/powerpoint/2010/main" val="3074147638"/>
+      </p:ext>
+    </p:extLst>
+  </p:cSld>
+  <p:clrMapOvr>
+    <a:masterClrMapping/>
+  </p:clrMapOvr>
+</p:sld>
+</file>
+
+<file path=ppt/slides/slide20.xml><?xml version="1.0" encoding="utf-8"?>
+<p:sld xmlns:a="http://schemas.openxmlformats.org/drawingml/2006/main" xmlns:r="http://schemas.openxmlformats.org/officeDocument/2006/relationships" xmlns:p="http://schemas.openxmlformats.org/presentationml/2006/main">
+  <p:cSld>
+    <p:spTree>
+      <p:nvGrpSpPr>
+        <p:cNvPr id="1" name=""/>
+        <p:cNvGrpSpPr/>
+        <p:nvPr/>
+      </p:nvGrpSpPr>
+      <p:grpSpPr>
+        <a:xfrm>
+          <a:off x="0" y="0"/>
+          <a:ext cx="0" cy="0"/>
+          <a:chOff x="0" y="0"/>
+          <a:chExt cx="0" cy="0"/>
+        </a:xfrm>
+      </p:grpSpPr>
+      <p:pic>
+        <p:nvPicPr>
+          <p:cNvPr id="7" name="Picture 6">
+            <a:extLst>
+              <a:ext uri="{FF2B5EF4-FFF2-40B4-BE49-F238E27FC236}">
+                <a16:creationId xmlns:a16="http://schemas.microsoft.com/office/drawing/2014/main" id="{906632BD-B552-A517-861E-AA84ED9D748E}"/>
+              </a:ext>
+            </a:extLst>
+          </p:cNvPr>
+          <p:cNvPicPr>
+            <a:picLocks noChangeAspect="1"/>
+          </p:cNvPicPr>
+          <p:nvPr/>
+        </p:nvPicPr>
+        <p:blipFill>
+          <a:blip r:embed="rId2"/>
+          <a:stretch>
+            <a:fillRect/>
+          </a:stretch>
+        </p:blipFill>
+        <p:spPr>
+          <a:xfrm>
+            <a:off x="2252860" y="1208120"/>
+            <a:ext cx="2762250" cy="3676650"/>
+          </a:xfrm>
+          <a:prstGeom prst="rect">
+            <a:avLst/>
+          </a:prstGeom>
+        </p:spPr>
+      </p:pic>
+      <p:sp>
+        <p:nvSpPr>
+          <p:cNvPr id="4" name="Arrow: Down 3">
+            <a:extLst>
+              <a:ext uri="{FF2B5EF4-FFF2-40B4-BE49-F238E27FC236}">
+                <a16:creationId xmlns:a16="http://schemas.microsoft.com/office/drawing/2014/main" id="{CB54D65D-A18E-A1E9-19A1-948E1B397135}"/>
+              </a:ext>
+            </a:extLst>
+          </p:cNvPr>
+          <p:cNvSpPr/>
+          <p:nvPr/>
+        </p:nvSpPr>
+        <p:spPr>
+          <a:xfrm>
+            <a:off x="5661838" y="5490757"/>
+            <a:ext cx="781235" cy="1071978"/>
+          </a:xfrm>
+          <a:prstGeom prst="downArrow">
+            <a:avLst/>
+          </a:prstGeom>
+        </p:spPr>
+        <p:style>
+          <a:lnRef idx="2">
+            <a:schemeClr val="accent1">
+              <a:shade val="50000"/>
+            </a:schemeClr>
+          </a:lnRef>
+          <a:fillRef idx="1">
+            <a:schemeClr val="accent1"/>
+          </a:fillRef>
+          <a:effectRef idx="0">
+            <a:schemeClr val="accent1"/>
+          </a:effectRef>
+          <a:fontRef idx="minor">
+            <a:schemeClr val="lt1"/>
+          </a:fontRef>
+        </p:style>
+        <p:txBody>
+          <a:bodyPr rtlCol="0" anchor="ctr"/>
+          <a:lstStyle/>
+          <a:p>
+            <a:pPr algn="ctr"/>
+            <a:endParaRPr lang="en-GB" b="1" dirty="0"/>
+          </a:p>
+        </p:txBody>
+      </p:sp>
+      <p:sp>
+        <p:nvSpPr>
+          <p:cNvPr id="5" name="TextBox 4">
+            <a:extLst>
+              <a:ext uri="{FF2B5EF4-FFF2-40B4-BE49-F238E27FC236}">
+                <a16:creationId xmlns:a16="http://schemas.microsoft.com/office/drawing/2014/main" id="{5F3F79A1-D8C9-1A67-B587-C36153D5DD27}"/>
+              </a:ext>
+            </a:extLst>
+          </p:cNvPr>
+          <p:cNvSpPr txBox="1"/>
+          <p:nvPr/>
+        </p:nvSpPr>
+        <p:spPr>
+          <a:xfrm>
+            <a:off x="1898576" y="4133800"/>
+            <a:ext cx="2537759" cy="369332"/>
+          </a:xfrm>
+          <a:prstGeom prst="rect">
+            <a:avLst/>
+          </a:prstGeom>
+          <a:noFill/>
+          <a:ln w="28575">
+            <a:solidFill>
+              <a:schemeClr val="accent1">
+                <a:shade val="50000"/>
+              </a:schemeClr>
+            </a:solidFill>
+          </a:ln>
+        </p:spPr>
+        <p:txBody>
+          <a:bodyPr wrap="square" rtlCol="0">
+            <a:spAutoFit/>
+          </a:bodyPr>
+          <a:lstStyle/>
+          <a:p>
+            <a:endParaRPr lang="en-GB" dirty="0"/>
+          </a:p>
+        </p:txBody>
+      </p:sp>
+      <p:sp>
+        <p:nvSpPr>
+          <p:cNvPr id="6" name="Speech Bubble: Oval 5">
+            <a:extLst>
+              <a:ext uri="{FF2B5EF4-FFF2-40B4-BE49-F238E27FC236}">
+                <a16:creationId xmlns:a16="http://schemas.microsoft.com/office/drawing/2014/main" id="{76E5A943-9673-21C6-5DCF-166C1BF726A8}"/>
+              </a:ext>
+            </a:extLst>
+          </p:cNvPr>
+          <p:cNvSpPr/>
+          <p:nvPr/>
+        </p:nvSpPr>
+        <p:spPr>
+          <a:xfrm>
+            <a:off x="4807137" y="313926"/>
+            <a:ext cx="6333615" cy="578498"/>
+          </a:xfrm>
+          <a:prstGeom prst="wedgeEllipseCallout">
+            <a:avLst>
+              <a:gd name="adj1" fmla="val -64689"/>
+              <a:gd name="adj2" fmla="val 660367"/>
+            </a:avLst>
+          </a:prstGeom>
+        </p:spPr>
+        <p:style>
+          <a:lnRef idx="1">
+            <a:schemeClr val="accent4"/>
+          </a:lnRef>
+          <a:fillRef idx="2">
+            <a:schemeClr val="accent4"/>
+          </a:fillRef>
+          <a:effectRef idx="1">
+            <a:schemeClr val="accent4"/>
+          </a:effectRef>
+          <a:fontRef idx="minor">
+            <a:schemeClr val="dk1"/>
+          </a:fontRef>
+        </p:style>
+        <p:txBody>
+          <a:bodyPr rtlCol="0" anchor="ctr"/>
+          <a:lstStyle/>
+          <a:p>
+            <a:pPr algn="ctr"/>
+            <a:r>
+              <a:rPr lang="en-GB" dirty="0"/>
+              <a:t>Create a pull request</a:t>
+            </a:r>
+            <a:endParaRPr lang="en-GB" b="1" dirty="0"/>
+          </a:p>
+        </p:txBody>
+      </p:sp>
+    </p:spTree>
+    <p:extLst>
+      <p:ext uri="{BB962C8B-B14F-4D97-AF65-F5344CB8AC3E}">
+        <p14:creationId xmlns:p14="http://schemas.microsoft.com/office/powerpoint/2010/main" val="1860400913"/>
+      </p:ext>
+    </p:extLst>
+  </p:cSld>
+  <p:clrMapOvr>
+    <a:masterClrMapping/>
+  </p:clrMapOvr>
+</p:sld>
+</file>
+
+<file path=ppt/slides/slide21.xml><?xml version="1.0" encoding="utf-8"?>
+<p:sld xmlns:a="http://schemas.openxmlformats.org/drawingml/2006/main" xmlns:r="http://schemas.openxmlformats.org/officeDocument/2006/relationships" xmlns:p="http://schemas.openxmlformats.org/presentationml/2006/main">
+  <p:cSld>
+    <p:spTree>
+      <p:nvGrpSpPr>
+        <p:cNvPr id="1" name=""/>
+        <p:cNvGrpSpPr/>
+        <p:nvPr/>
+      </p:nvGrpSpPr>
+      <p:grpSpPr>
+        <a:xfrm>
+          <a:off x="0" y="0"/>
+          <a:ext cx="0" cy="0"/>
+          <a:chOff x="0" y="0"/>
+          <a:chExt cx="0" cy="0"/>
+        </a:xfrm>
+      </p:grpSpPr>
+      <p:pic>
+        <p:nvPicPr>
+          <p:cNvPr id="5" name="Picture 4">
+            <a:extLst>
+              <a:ext uri="{FF2B5EF4-FFF2-40B4-BE49-F238E27FC236}">
+                <a16:creationId xmlns:a16="http://schemas.microsoft.com/office/drawing/2014/main" id="{AFB4031C-A867-97C0-5488-F14CA89C263A}"/>
+              </a:ext>
+            </a:extLst>
+          </p:cNvPr>
+          <p:cNvPicPr>
+            <a:picLocks noChangeAspect="1"/>
+          </p:cNvPicPr>
+          <p:nvPr/>
+        </p:nvPicPr>
+        <p:blipFill>
+          <a:blip r:embed="rId2"/>
+          <a:stretch>
+            <a:fillRect/>
+          </a:stretch>
+        </p:blipFill>
+        <p:spPr>
+          <a:xfrm>
+            <a:off x="306031" y="961053"/>
+            <a:ext cx="11020264" cy="5241763"/>
+          </a:xfrm>
+          <a:prstGeom prst="rect">
+            <a:avLst/>
+          </a:prstGeom>
+        </p:spPr>
+      </p:pic>
+      <p:sp>
+        <p:nvSpPr>
+          <p:cNvPr id="6" name="TextBox 5">
+            <a:extLst>
+              <a:ext uri="{FF2B5EF4-FFF2-40B4-BE49-F238E27FC236}">
+                <a16:creationId xmlns:a16="http://schemas.microsoft.com/office/drawing/2014/main" id="{C397B41A-76B2-745C-B450-FA3E2DDB56DA}"/>
+              </a:ext>
+            </a:extLst>
+          </p:cNvPr>
+          <p:cNvSpPr txBox="1"/>
+          <p:nvPr/>
+        </p:nvSpPr>
+        <p:spPr>
+          <a:xfrm>
+            <a:off x="189012" y="2587637"/>
+            <a:ext cx="11309081" cy="369332"/>
+          </a:xfrm>
+          <a:prstGeom prst="rect">
+            <a:avLst/>
+          </a:prstGeom>
+          <a:noFill/>
+          <a:ln w="28575">
+            <a:solidFill>
+              <a:schemeClr val="accent1">
+                <a:shade val="50000"/>
+              </a:schemeClr>
+            </a:solidFill>
+          </a:ln>
+        </p:spPr>
+        <p:txBody>
+          <a:bodyPr wrap="square" rtlCol="0">
+            <a:spAutoFit/>
+          </a:bodyPr>
+          <a:lstStyle/>
+          <a:p>
+            <a:endParaRPr lang="en-GB" dirty="0"/>
+          </a:p>
+        </p:txBody>
+      </p:sp>
+      <p:sp>
+        <p:nvSpPr>
+          <p:cNvPr id="7" name="Speech Bubble: Oval 6">
+            <a:extLst>
+              <a:ext uri="{FF2B5EF4-FFF2-40B4-BE49-F238E27FC236}">
+                <a16:creationId xmlns:a16="http://schemas.microsoft.com/office/drawing/2014/main" id="{D31385D0-F591-2771-5368-014BA9F1606F}"/>
+              </a:ext>
+            </a:extLst>
+          </p:cNvPr>
+          <p:cNvSpPr/>
+          <p:nvPr/>
+        </p:nvSpPr>
+        <p:spPr>
+          <a:xfrm>
+            <a:off x="3745149" y="382555"/>
+            <a:ext cx="9241277" cy="578498"/>
+          </a:xfrm>
+          <a:prstGeom prst="wedgeEllipseCallout">
+            <a:avLst>
+              <a:gd name="adj1" fmla="val -25215"/>
+              <a:gd name="adj2" fmla="val 359372"/>
+            </a:avLst>
+          </a:prstGeom>
+        </p:spPr>
+        <p:style>
+          <a:lnRef idx="1">
+            <a:schemeClr val="accent4"/>
+          </a:lnRef>
+          <a:fillRef idx="2">
+            <a:schemeClr val="accent4"/>
+          </a:fillRef>
+          <a:effectRef idx="1">
+            <a:schemeClr val="accent4"/>
+          </a:effectRef>
+          <a:fontRef idx="minor">
+            <a:schemeClr val="dk1"/>
+          </a:fontRef>
+        </p:style>
+        <p:txBody>
+          <a:bodyPr rtlCol="0" anchor="ctr"/>
+          <a:lstStyle/>
+          <a:p>
+            <a:pPr algn="ctr"/>
+            <a:r>
+              <a:rPr lang="en-GB" dirty="0"/>
+              <a:t>This was our original query!!</a:t>
+            </a:r>
+          </a:p>
+        </p:txBody>
+      </p:sp>
+    </p:spTree>
+    <p:extLst>
+      <p:ext uri="{BB962C8B-B14F-4D97-AF65-F5344CB8AC3E}">
+        <p14:creationId xmlns:p14="http://schemas.microsoft.com/office/powerpoint/2010/main" val="3740986435"/>
       </p:ext>
     </p:extLst>
   </p:cSld>

</xml_diff>

<commit_message>
Minor edits to the proposed dev workflow pic
</commit_message>
<xml_diff>
--- a/synapse-sqlviews-integrationtesting/docs/Synapse-Presentation1.pptx
+++ b/synapse-sqlviews-integrationtesting/docs/Synapse-Presentation1.pptx
@@ -221,7 +221,7 @@
           <a:p>
             <a:fld id="{88BBF65C-509D-444C-B06A-3481FFEB325E}" type="datetimeFigureOut">
               <a:rPr lang="en-GB" smtClean="0"/>
-              <a:t>03/09/2022</a:t>
+              <a:t>12/09/2022</a:t>
             </a:fld>
             <a:endParaRPr lang="en-GB"/>
           </a:p>
@@ -1096,7 +1096,7 @@
           <a:p>
             <a:fld id="{FC05764E-BF05-4ADF-9C0D-E7E7BE4B37C6}" type="datetimeFigureOut">
               <a:rPr lang="en-GB" smtClean="0"/>
-              <a:t>03/09/2022</a:t>
+              <a:t>12/09/2022</a:t>
             </a:fld>
             <a:endParaRPr lang="en-GB"/>
           </a:p>
@@ -1296,7 +1296,7 @@
           <a:p>
             <a:fld id="{FC05764E-BF05-4ADF-9C0D-E7E7BE4B37C6}" type="datetimeFigureOut">
               <a:rPr lang="en-GB" smtClean="0"/>
-              <a:t>03/09/2022</a:t>
+              <a:t>12/09/2022</a:t>
             </a:fld>
             <a:endParaRPr lang="en-GB"/>
           </a:p>
@@ -1506,7 +1506,7 @@
           <a:p>
             <a:fld id="{FC05764E-BF05-4ADF-9C0D-E7E7BE4B37C6}" type="datetimeFigureOut">
               <a:rPr lang="en-GB" smtClean="0"/>
-              <a:t>03/09/2022</a:t>
+              <a:t>12/09/2022</a:t>
             </a:fld>
             <a:endParaRPr lang="en-GB"/>
           </a:p>
@@ -1706,7 +1706,7 @@
           <a:p>
             <a:fld id="{FC05764E-BF05-4ADF-9C0D-E7E7BE4B37C6}" type="datetimeFigureOut">
               <a:rPr lang="en-GB" smtClean="0"/>
-              <a:t>03/09/2022</a:t>
+              <a:t>12/09/2022</a:t>
             </a:fld>
             <a:endParaRPr lang="en-GB"/>
           </a:p>
@@ -1982,7 +1982,7 @@
           <a:p>
             <a:fld id="{FC05764E-BF05-4ADF-9C0D-E7E7BE4B37C6}" type="datetimeFigureOut">
               <a:rPr lang="en-GB" smtClean="0"/>
-              <a:t>03/09/2022</a:t>
+              <a:t>12/09/2022</a:t>
             </a:fld>
             <a:endParaRPr lang="en-GB"/>
           </a:p>
@@ -2250,7 +2250,7 @@
           <a:p>
             <a:fld id="{FC05764E-BF05-4ADF-9C0D-E7E7BE4B37C6}" type="datetimeFigureOut">
               <a:rPr lang="en-GB" smtClean="0"/>
-              <a:t>03/09/2022</a:t>
+              <a:t>12/09/2022</a:t>
             </a:fld>
             <a:endParaRPr lang="en-GB"/>
           </a:p>
@@ -2665,7 +2665,7 @@
           <a:p>
             <a:fld id="{FC05764E-BF05-4ADF-9C0D-E7E7BE4B37C6}" type="datetimeFigureOut">
               <a:rPr lang="en-GB" smtClean="0"/>
-              <a:t>03/09/2022</a:t>
+              <a:t>12/09/2022</a:t>
             </a:fld>
             <a:endParaRPr lang="en-GB"/>
           </a:p>
@@ -2807,7 +2807,7 @@
           <a:p>
             <a:fld id="{FC05764E-BF05-4ADF-9C0D-E7E7BE4B37C6}" type="datetimeFigureOut">
               <a:rPr lang="en-GB" smtClean="0"/>
-              <a:t>03/09/2022</a:t>
+              <a:t>12/09/2022</a:t>
             </a:fld>
             <a:endParaRPr lang="en-GB"/>
           </a:p>
@@ -2920,7 +2920,7 @@
           <a:p>
             <a:fld id="{FC05764E-BF05-4ADF-9C0D-E7E7BE4B37C6}" type="datetimeFigureOut">
               <a:rPr lang="en-GB" smtClean="0"/>
-              <a:t>03/09/2022</a:t>
+              <a:t>12/09/2022</a:t>
             </a:fld>
             <a:endParaRPr lang="en-GB"/>
           </a:p>
@@ -3233,7 +3233,7 @@
           <a:p>
             <a:fld id="{FC05764E-BF05-4ADF-9C0D-E7E7BE4B37C6}" type="datetimeFigureOut">
               <a:rPr lang="en-GB" smtClean="0"/>
-              <a:t>03/09/2022</a:t>
+              <a:t>12/09/2022</a:t>
             </a:fld>
             <a:endParaRPr lang="en-GB"/>
           </a:p>
@@ -3522,7 +3522,7 @@
           <a:p>
             <a:fld id="{FC05764E-BF05-4ADF-9C0D-E7E7BE4B37C6}" type="datetimeFigureOut">
               <a:rPr lang="en-GB" smtClean="0"/>
-              <a:t>03/09/2022</a:t>
+              <a:t>12/09/2022</a:t>
             </a:fld>
             <a:endParaRPr lang="en-GB"/>
           </a:p>
@@ -3765,7 +3765,7 @@
           <a:p>
             <a:fld id="{FC05764E-BF05-4ADF-9C0D-E7E7BE4B37C6}" type="datetimeFigureOut">
               <a:rPr lang="en-GB" smtClean="0"/>
-              <a:t>03/09/2022</a:t>
+              <a:t>12/09/2022</a:t>
             </a:fld>
             <a:endParaRPr lang="en-GB"/>
           </a:p>
@@ -8344,8 +8344,8 @@
         </p:nvSpPr>
         <p:spPr>
           <a:xfrm>
-            <a:off x="289248" y="1194321"/>
-            <a:ext cx="4217436" cy="4524315"/>
+            <a:off x="289248" y="447868"/>
+            <a:ext cx="4217436" cy="5632311"/>
           </a:xfrm>
           <a:prstGeom prst="rect">
             <a:avLst/>
@@ -8511,6 +8511,34 @@
               <a:t>|</a:t>
             </a:r>
           </a:p>
+          <a:p>
+            <a:r>
+              <a:rPr lang="en-GB" dirty="0"/>
+              <a:t>|</a:t>
+            </a:r>
+          </a:p>
+          <a:p>
+            <a:r>
+              <a:rPr lang="en-GB" dirty="0"/>
+              <a:t>+---</a:t>
+            </a:r>
+            <a:r>
+              <a:rPr lang="en-GB" b="1" dirty="0"/>
+              <a:t>synapse-tests</a:t>
+            </a:r>
+          </a:p>
+          <a:p>
+            <a:r>
+              <a:rPr lang="en-GB" dirty="0"/>
+              <a:t>|</a:t>
+            </a:r>
+          </a:p>
+          <a:p>
+            <a:r>
+              <a:rPr lang="en-GB" dirty="0"/>
+              <a:t>|</a:t>
+            </a:r>
+          </a:p>
         </p:txBody>
       </p:sp>
       <p:sp>
@@ -8527,7 +8555,7 @@
         </p:nvSpPr>
         <p:spPr>
           <a:xfrm>
-            <a:off x="716698" y="2652128"/>
+            <a:off x="716698" y="1905675"/>
             <a:ext cx="3239482" cy="1220076"/>
           </a:xfrm>
           <a:prstGeom prst="rect">
@@ -8564,13 +8592,13 @@
         </p:nvSpPr>
         <p:spPr>
           <a:xfrm>
-            <a:off x="666047" y="6195529"/>
+            <a:off x="5713680" y="4312495"/>
             <a:ext cx="3943275" cy="578498"/>
           </a:xfrm>
           <a:prstGeom prst="wedgeEllipseCallout">
             <a:avLst>
-              <a:gd name="adj1" fmla="val -13239"/>
-              <a:gd name="adj2" fmla="val -282564"/>
+              <a:gd name="adj1" fmla="val -125634"/>
+              <a:gd name="adj2" fmla="val -119662"/>
             </a:avLst>
           </a:prstGeom>
         </p:spPr>
@@ -8614,7 +8642,7 @@
         </p:nvSpPr>
         <p:spPr>
           <a:xfrm>
-            <a:off x="5455762" y="2276669"/>
+            <a:off x="5474423" y="1418926"/>
             <a:ext cx="3943275" cy="973497"/>
           </a:xfrm>
           <a:prstGeom prst="wedgeEllipseCallout">
@@ -8664,7 +8692,7 @@
         </p:nvSpPr>
         <p:spPr>
           <a:xfrm>
-            <a:off x="716698" y="1509804"/>
+            <a:off x="716698" y="763351"/>
             <a:ext cx="2446380" cy="766865"/>
           </a:xfrm>
           <a:prstGeom prst="rect">
@@ -8689,58 +8717,6 @@
       </p:sp>
       <p:sp>
         <p:nvSpPr>
-          <p:cNvPr id="21" name="Title 1">
-            <a:extLst>
-              <a:ext uri="{FF2B5EF4-FFF2-40B4-BE49-F238E27FC236}">
-                <a16:creationId xmlns:a16="http://schemas.microsoft.com/office/drawing/2014/main" id="{5DA844A7-B5A6-8DFA-4BF3-9A2DA051348C}"/>
-              </a:ext>
-            </a:extLst>
-          </p:cNvPr>
-          <p:cNvSpPr txBox="1">
-            <a:spLocks/>
-          </p:cNvSpPr>
-          <p:nvPr/>
-        </p:nvSpPr>
-        <p:spPr>
-          <a:xfrm>
-            <a:off x="3467877" y="266415"/>
-            <a:ext cx="5256245" cy="778613"/>
-          </a:xfrm>
-          <a:prstGeom prst="rect">
-            <a:avLst/>
-          </a:prstGeom>
-        </p:spPr>
-        <p:txBody>
-          <a:bodyPr/>
-          <a:lstStyle>
-            <a:lvl1pPr algn="l" defTabSz="914400" rtl="0" eaLnBrk="1" latinLnBrk="0" hangingPunct="1">
-              <a:lnSpc>
-                <a:spcPct val="90000"/>
-              </a:lnSpc>
-              <a:spcBef>
-                <a:spcPct val="0"/>
-              </a:spcBef>
-              <a:buNone/>
-              <a:defRPr sz="4400" kern="1200">
-                <a:solidFill>
-                  <a:schemeClr val="tx1"/>
-                </a:solidFill>
-                <a:latin typeface="+mj-lt"/>
-                <a:ea typeface="+mj-ea"/>
-                <a:cs typeface="+mj-cs"/>
-              </a:defRPr>
-            </a:lvl1pPr>
-          </a:lstStyle>
-          <a:p>
-            <a:r>
-              <a:rPr lang="en-GB" dirty="0"/>
-              <a:t>Folder structure</a:t>
-            </a:r>
-          </a:p>
-        </p:txBody>
-      </p:sp>
-      <p:sp>
-        <p:nvSpPr>
           <p:cNvPr id="23" name="Speech Bubble: Oval 22">
             <a:extLst>
               <a:ext uri="{FF2B5EF4-FFF2-40B4-BE49-F238E27FC236}">
@@ -8753,7 +8729,7 @@
         </p:nvSpPr>
         <p:spPr>
           <a:xfrm>
-            <a:off x="5608162" y="3763347"/>
+            <a:off x="5623716" y="2889034"/>
             <a:ext cx="3943275" cy="973497"/>
           </a:xfrm>
           <a:prstGeom prst="wedgeEllipseCallout">
@@ -8803,8 +8779,8 @@
         </p:nvSpPr>
         <p:spPr>
           <a:xfrm>
-            <a:off x="791345" y="4776571"/>
-            <a:ext cx="2213111" cy="571625"/>
+            <a:off x="716699" y="3763348"/>
+            <a:ext cx="2287758" cy="838396"/>
           </a:xfrm>
           <a:prstGeom prst="rect">
             <a:avLst/>
@@ -8823,6 +8799,101 @@
           <a:lstStyle/>
           <a:p>
             <a:endParaRPr lang="en-GB" dirty="0"/>
+          </a:p>
+        </p:txBody>
+      </p:sp>
+      <p:sp>
+        <p:nvSpPr>
+          <p:cNvPr id="5" name="TextBox 4">
+            <a:extLst>
+              <a:ext uri="{FF2B5EF4-FFF2-40B4-BE49-F238E27FC236}">
+                <a16:creationId xmlns:a16="http://schemas.microsoft.com/office/drawing/2014/main" id="{22AD9A77-16AC-9D18-2D7C-E49F08D1966B}"/>
+              </a:ext>
+            </a:extLst>
+          </p:cNvPr>
+          <p:cNvSpPr txBox="1"/>
+          <p:nvPr/>
+        </p:nvSpPr>
+        <p:spPr>
+          <a:xfrm>
+            <a:off x="701153" y="5050265"/>
+            <a:ext cx="2213111" cy="571625"/>
+          </a:xfrm>
+          <a:prstGeom prst="rect">
+            <a:avLst/>
+          </a:prstGeom>
+          <a:noFill/>
+          <a:ln w="28575">
+            <a:solidFill>
+              <a:srgbClr val="FFC000"/>
+            </a:solidFill>
+          </a:ln>
+        </p:spPr>
+        <p:txBody>
+          <a:bodyPr wrap="square" rtlCol="0">
+            <a:spAutoFit/>
+          </a:bodyPr>
+          <a:lstStyle/>
+          <a:p>
+            <a:endParaRPr lang="en-GB" dirty="0"/>
+          </a:p>
+        </p:txBody>
+      </p:sp>
+      <p:sp>
+        <p:nvSpPr>
+          <p:cNvPr id="12" name="Speech Bubble: Oval 11">
+            <a:extLst>
+              <a:ext uri="{FF2B5EF4-FFF2-40B4-BE49-F238E27FC236}">
+                <a16:creationId xmlns:a16="http://schemas.microsoft.com/office/drawing/2014/main" id="{76A4BF9F-57F0-272D-A5EF-737357724FCC}"/>
+              </a:ext>
+            </a:extLst>
+          </p:cNvPr>
+          <p:cNvSpPr/>
+          <p:nvPr/>
+        </p:nvSpPr>
+        <p:spPr>
+          <a:xfrm>
+            <a:off x="5791435" y="5576329"/>
+            <a:ext cx="3943275" cy="578498"/>
+          </a:xfrm>
+          <a:prstGeom prst="wedgeEllipseCallout">
+            <a:avLst>
+              <a:gd name="adj1" fmla="val -125634"/>
+              <a:gd name="adj2" fmla="val -119662"/>
+            </a:avLst>
+          </a:prstGeom>
+        </p:spPr>
+        <p:style>
+          <a:lnRef idx="1">
+            <a:schemeClr val="accent4"/>
+          </a:lnRef>
+          <a:fillRef idx="2">
+            <a:schemeClr val="accent4"/>
+          </a:fillRef>
+          <a:effectRef idx="1">
+            <a:schemeClr val="accent4"/>
+          </a:effectRef>
+          <a:fontRef idx="minor">
+            <a:schemeClr val="dk1"/>
+          </a:fontRef>
+        </p:style>
+        <p:txBody>
+          <a:bodyPr rtlCol="0" anchor="ctr"/>
+          <a:lstStyle/>
+          <a:p>
+            <a:pPr algn="ctr"/>
+            <a:r>
+              <a:rPr lang="en-GB" dirty="0"/>
+              <a:t>VS.NET Integration tests (</a:t>
+            </a:r>
+            <a:r>
+              <a:rPr lang="en-GB" b="1" dirty="0"/>
+              <a:t>C#</a:t>
+            </a:r>
+            <a:r>
+              <a:rPr lang="en-GB" dirty="0"/>
+              <a:t>)</a:t>
+            </a:r>
           </a:p>
         </p:txBody>
       </p:sp>
@@ -9082,8 +9153,8 @@
         </p:nvSpPr>
         <p:spPr>
           <a:xfrm>
-            <a:off x="5278017" y="1272561"/>
-            <a:ext cx="2593910" cy="369332"/>
+            <a:off x="5278015" y="1059919"/>
+            <a:ext cx="2593910" cy="646331"/>
           </a:xfrm>
           <a:prstGeom prst="rect">
             <a:avLst/>
@@ -9103,7 +9174,7 @@
           <a:p>
             <a:r>
               <a:rPr lang="en-GB" dirty="0"/>
-              <a:t>Add new table SQL</a:t>
+              <a:t>Add new ‘CREATE TABLE’ SQL file</a:t>
             </a:r>
           </a:p>
         </p:txBody>

</xml_diff>

<commit_message>
Improvements to Hypo business scenario
</commit_message>
<xml_diff>
--- a/synapse-sqlviews-integrationtesting/docs/Synapse-Presentation1.pptx
+++ b/synapse-sqlviews-integrationtesting/docs/Synapse-Presentation1.pptx
@@ -533,32 +533,9 @@
           <a:bodyPr/>
           <a:lstStyle/>
           <a:p>
-            <a:pPr marL="0" marR="0" lvl="0" indent="0" algn="l" defTabSz="914400" rtl="0" eaLnBrk="1" fontAlgn="auto" latinLnBrk="0" hangingPunct="1">
-              <a:lnSpc>
-                <a:spcPct val="100000"/>
-              </a:lnSpc>
-              <a:spcBef>
-                <a:spcPts val="0"/>
-              </a:spcBef>
-              <a:spcAft>
-                <a:spcPts val="0"/>
-              </a:spcAft>
-              <a:buClrTx/>
-              <a:buSzTx/>
-              <a:buFontTx/>
-              <a:buNone/>
-              <a:tabLst/>
-              <a:defRPr/>
-            </a:pPr>
-            <a:r>
-              <a:rPr lang="en-GB" b="0">
-                <a:solidFill>
-                  <a:srgbClr val="333333"/>
-                </a:solidFill>
-                <a:effectLst/>
-                <a:latin typeface="Consolas" panose="020B0609020204030204" pitchFamily="49" charset="0"/>
-              </a:rPr>
-              <a:t>Power-Csv-to-external-tables.png</a:t>
+            <a:r>
+              <a:rPr lang="en-GB" dirty="0"/>
+              <a:t>Power-Contoso-Overview.png</a:t>
             </a:r>
           </a:p>
         </p:txBody>
@@ -580,7 +557,7 @@
           <a:p>
             <a:fld id="{3AF3C875-D77B-4509-8094-872B8762C478}" type="slidenum">
               <a:rPr lang="en-GB" smtClean="0"/>
-              <a:t>4</a:t>
+              <a:t>3</a:t>
             </a:fld>
             <a:endParaRPr lang="en-GB"/>
           </a:p>
@@ -589,7 +566,7 @@
     </p:spTree>
     <p:extLst>
       <p:ext uri="{BB962C8B-B14F-4D97-AF65-F5344CB8AC3E}">
-        <p14:creationId xmlns:p14="http://schemas.microsoft.com/office/powerpoint/2010/main" val="3323389339"/>
+        <p14:creationId xmlns:p14="http://schemas.microsoft.com/office/powerpoint/2010/main" val="2243401179"/>
       </p:ext>
     </p:extLst>
   </p:cSld>
@@ -643,9 +620,32 @@
           <a:bodyPr/>
           <a:lstStyle/>
           <a:p>
-            <a:r>
-              <a:rPr lang="en-GB" dirty="0"/>
-              <a:t>Power-dev-flow-create-credential.png</a:t>
+            <a:pPr marL="0" marR="0" lvl="0" indent="0" algn="l" defTabSz="914400" rtl="0" eaLnBrk="1" fontAlgn="auto" latinLnBrk="0" hangingPunct="1">
+              <a:lnSpc>
+                <a:spcPct val="100000"/>
+              </a:lnSpc>
+              <a:spcBef>
+                <a:spcPts val="0"/>
+              </a:spcBef>
+              <a:spcAft>
+                <a:spcPts val="0"/>
+              </a:spcAft>
+              <a:buClrTx/>
+              <a:buSzTx/>
+              <a:buFontTx/>
+              <a:buNone/>
+              <a:tabLst/>
+              <a:defRPr/>
+            </a:pPr>
+            <a:r>
+              <a:rPr lang="en-GB" b="0">
+                <a:solidFill>
+                  <a:srgbClr val="333333"/>
+                </a:solidFill>
+                <a:effectLst/>
+                <a:latin typeface="Consolas" panose="020B0609020204030204" pitchFamily="49" charset="0"/>
+              </a:rPr>
+              <a:t>Power-Csv-to-external-tables.png</a:t>
             </a:r>
           </a:p>
         </p:txBody>
@@ -667,7 +667,7 @@
           <a:p>
             <a:fld id="{3AF3C875-D77B-4509-8094-872B8762C478}" type="slidenum">
               <a:rPr lang="en-GB" smtClean="0"/>
-              <a:t>8</a:t>
+              <a:t>4</a:t>
             </a:fld>
             <a:endParaRPr lang="en-GB"/>
           </a:p>
@@ -676,7 +676,7 @@
     </p:spTree>
     <p:extLst>
       <p:ext uri="{BB962C8B-B14F-4D97-AF65-F5344CB8AC3E}">
-        <p14:creationId xmlns:p14="http://schemas.microsoft.com/office/powerpoint/2010/main" val="3838728080"/>
+        <p14:creationId xmlns:p14="http://schemas.microsoft.com/office/powerpoint/2010/main" val="3323389339"/>
       </p:ext>
     </p:extLst>
   </p:cSld>
@@ -732,7 +732,7 @@
           <a:p>
             <a:r>
               <a:rPr lang="en-GB" dirty="0"/>
-              <a:t>Power-dev-flow-pandas.png</a:t>
+              <a:t>Power-dev-flow-create-credential.png</a:t>
             </a:r>
           </a:p>
         </p:txBody>
@@ -754,7 +754,7 @@
           <a:p>
             <a:fld id="{3AF3C875-D77B-4509-8094-872B8762C478}" type="slidenum">
               <a:rPr lang="en-GB" smtClean="0"/>
-              <a:t>12</a:t>
+              <a:t>8</a:t>
             </a:fld>
             <a:endParaRPr lang="en-GB"/>
           </a:p>
@@ -763,7 +763,7 @@
     </p:spTree>
     <p:extLst>
       <p:ext uri="{BB962C8B-B14F-4D97-AF65-F5344CB8AC3E}">
-        <p14:creationId xmlns:p14="http://schemas.microsoft.com/office/powerpoint/2010/main" val="1052489859"/>
+        <p14:creationId xmlns:p14="http://schemas.microsoft.com/office/powerpoint/2010/main" val="3838728080"/>
       </p:ext>
     </p:extLst>
   </p:cSld>
@@ -819,6 +819,93 @@
           <a:p>
             <a:r>
               <a:rPr lang="en-GB" dirty="0"/>
+              <a:t>Power-dev-flow-pandas.png</a:t>
+            </a:r>
+          </a:p>
+        </p:txBody>
+      </p:sp>
+      <p:sp>
+        <p:nvSpPr>
+          <p:cNvPr id="4" name="Slide Number Placeholder 3"/>
+          <p:cNvSpPr>
+            <a:spLocks noGrp="1"/>
+          </p:cNvSpPr>
+          <p:nvPr>
+            <p:ph type="sldNum" sz="quarter" idx="5"/>
+          </p:nvPr>
+        </p:nvSpPr>
+        <p:spPr/>
+        <p:txBody>
+          <a:bodyPr/>
+          <a:lstStyle/>
+          <a:p>
+            <a:fld id="{3AF3C875-D77B-4509-8094-872B8762C478}" type="slidenum">
+              <a:rPr lang="en-GB" smtClean="0"/>
+              <a:t>12</a:t>
+            </a:fld>
+            <a:endParaRPr lang="en-GB"/>
+          </a:p>
+        </p:txBody>
+      </p:sp>
+    </p:spTree>
+    <p:extLst>
+      <p:ext uri="{BB962C8B-B14F-4D97-AF65-F5344CB8AC3E}">
+        <p14:creationId xmlns:p14="http://schemas.microsoft.com/office/powerpoint/2010/main" val="1052489859"/>
+      </p:ext>
+    </p:extLst>
+  </p:cSld>
+  <p:clrMapOvr>
+    <a:masterClrMapping/>
+  </p:clrMapOvr>
+</p:notes>
+</file>
+
+<file path=ppt/notesSlides/notesSlide5.xml><?xml version="1.0" encoding="utf-8"?>
+<p:notes xmlns:a="http://schemas.openxmlformats.org/drawingml/2006/main" xmlns:r="http://schemas.openxmlformats.org/officeDocument/2006/relationships" xmlns:p="http://schemas.openxmlformats.org/presentationml/2006/main">
+  <p:cSld>
+    <p:spTree>
+      <p:nvGrpSpPr>
+        <p:cNvPr id="1" name=""/>
+        <p:cNvGrpSpPr/>
+        <p:nvPr/>
+      </p:nvGrpSpPr>
+      <p:grpSpPr>
+        <a:xfrm>
+          <a:off x="0" y="0"/>
+          <a:ext cx="0" cy="0"/>
+          <a:chOff x="0" y="0"/>
+          <a:chExt cx="0" cy="0"/>
+        </a:xfrm>
+      </p:grpSpPr>
+      <p:sp>
+        <p:nvSpPr>
+          <p:cNvPr id="2" name="Slide Image Placeholder 1"/>
+          <p:cNvSpPr>
+            <a:spLocks noGrp="1" noRot="1" noChangeAspect="1"/>
+          </p:cNvSpPr>
+          <p:nvPr>
+            <p:ph type="sldImg"/>
+          </p:nvPr>
+        </p:nvSpPr>
+        <p:spPr/>
+      </p:sp>
+      <p:sp>
+        <p:nvSpPr>
+          <p:cNvPr id="3" name="Notes Placeholder 2"/>
+          <p:cNvSpPr>
+            <a:spLocks noGrp="1"/>
+          </p:cNvSpPr>
+          <p:nvPr>
+            <p:ph type="body" idx="1"/>
+          </p:nvPr>
+        </p:nvSpPr>
+        <p:spPr/>
+        <p:txBody>
+          <a:bodyPr/>
+          <a:lstStyle/>
+          <a:p>
+            <a:r>
+              <a:rPr lang="en-GB" dirty="0"/>
               <a:t>Power-proposed-solution-dev-workflow.png</a:t>
             </a:r>
           </a:p>
@@ -860,7 +947,7 @@
 </p:notes>
 </file>
 
-<file path=ppt/notesSlides/notesSlide5.xml><?xml version="1.0" encoding="utf-8"?>
+<file path=ppt/notesSlides/notesSlide6.xml><?xml version="1.0" encoding="utf-8"?>
 <p:notes xmlns:a="http://schemas.openxmlformats.org/drawingml/2006/main" xmlns:r="http://schemas.openxmlformats.org/officeDocument/2006/relationships" xmlns:p="http://schemas.openxmlformats.org/presentationml/2006/main">
   <p:cSld>
     <p:spTree>
@@ -9841,7 +9928,7 @@
         <p:spPr>
           <a:xfrm>
             <a:off x="3919491" y="3031727"/>
-            <a:ext cx="3986074" cy="896645"/>
+            <a:ext cx="2355691" cy="896645"/>
           </a:xfrm>
           <a:prstGeom prst="roundRect">
             <a:avLst/>
@@ -9889,7 +9976,7 @@
         </p:nvSpPr>
         <p:spPr>
           <a:xfrm>
-            <a:off x="942513" y="5166063"/>
+            <a:off x="942513" y="5858522"/>
             <a:ext cx="2555289" cy="896645"/>
           </a:xfrm>
           <a:prstGeom prst="roundRect">
@@ -9950,7 +10037,7 @@
         </p:nvSpPr>
         <p:spPr>
           <a:xfrm>
-            <a:off x="4406284" y="5166062"/>
+            <a:off x="4406284" y="5858521"/>
             <a:ext cx="2555289" cy="896645"/>
           </a:xfrm>
           <a:prstGeom prst="roundRect">
@@ -10011,7 +10098,7 @@
         </p:nvSpPr>
         <p:spPr>
           <a:xfrm>
-            <a:off x="8001740" y="5166062"/>
+            <a:off x="8001740" y="5858521"/>
             <a:ext cx="3247747" cy="896645"/>
           </a:xfrm>
           <a:prstGeom prst="roundRect">
@@ -10119,13 +10206,13 @@
           <p:nvPr/>
         </p:nvPicPr>
         <p:blipFill>
-          <a:blip r:embed="rId2">
+          <a:blip r:embed="rId3">
             <a:extLst>
               <a:ext uri="{28A0092B-C50C-407E-A947-70E740481C1C}">
                 <a14:useLocalDpi xmlns:a14="http://schemas.microsoft.com/office/drawing/2010/main" val="0"/>
               </a:ext>
               <a:ext uri="{837473B0-CC2E-450A-ABE3-18F120FF3D39}">
-                <a1611:picAttrSrcUrl xmlns:a1611="http://schemas.microsoft.com/office/drawing/2016/11/main" r:id="rId3"/>
+                <a1611:picAttrSrcUrl xmlns:a1611="http://schemas.microsoft.com/office/drawing/2016/11/main" r:id="rId4"/>
               </a:ext>
             </a:extLst>
           </a:blip>
@@ -10408,6 +10495,147 @@
           <a:prstGeom prst="leftArrow">
             <a:avLst/>
           </a:prstGeom>
+        </p:spPr>
+        <p:style>
+          <a:lnRef idx="2">
+            <a:schemeClr val="accent1">
+              <a:shade val="50000"/>
+            </a:schemeClr>
+          </a:lnRef>
+          <a:fillRef idx="1">
+            <a:schemeClr val="accent1"/>
+          </a:fillRef>
+          <a:effectRef idx="0">
+            <a:schemeClr val="accent1"/>
+          </a:effectRef>
+          <a:fontRef idx="minor">
+            <a:schemeClr val="lt1"/>
+          </a:fontRef>
+        </p:style>
+        <p:txBody>
+          <a:bodyPr rtlCol="0" anchor="ctr"/>
+          <a:lstStyle/>
+          <a:p>
+            <a:pPr algn="ctr"/>
+            <a:endParaRPr lang="en-GB"/>
+          </a:p>
+        </p:txBody>
+      </p:sp>
+      <p:sp>
+        <p:nvSpPr>
+          <p:cNvPr id="8" name="TextBox 7">
+            <a:extLst>
+              <a:ext uri="{FF2B5EF4-FFF2-40B4-BE49-F238E27FC236}">
+                <a16:creationId xmlns:a16="http://schemas.microsoft.com/office/drawing/2014/main" id="{A37B695E-0B91-8884-16E6-1BA34EA78DAF}"/>
+              </a:ext>
+            </a:extLst>
+          </p:cNvPr>
+          <p:cNvSpPr txBox="1"/>
+          <p:nvPr/>
+        </p:nvSpPr>
+        <p:spPr>
+          <a:xfrm>
+            <a:off x="1048945" y="5194053"/>
+            <a:ext cx="9861711" cy="369332"/>
+          </a:xfrm>
+          <a:prstGeom prst="rect">
+            <a:avLst/>
+          </a:prstGeom>
+          <a:solidFill>
+            <a:srgbClr val="FFFF00"/>
+          </a:solidFill>
+          <a:ln>
+            <a:solidFill>
+              <a:schemeClr val="accent1">
+                <a:shade val="50000"/>
+              </a:schemeClr>
+            </a:solidFill>
+          </a:ln>
+        </p:spPr>
+        <p:txBody>
+          <a:bodyPr wrap="square" rtlCol="0">
+            <a:spAutoFit/>
+          </a:bodyPr>
+          <a:lstStyle/>
+          <a:p>
+            <a:pPr algn="ctr"/>
+            <a:r>
+              <a:rPr lang="en-GB" dirty="0"/>
+              <a:t>External sources and parties</a:t>
+            </a:r>
+          </a:p>
+        </p:txBody>
+      </p:sp>
+      <p:sp>
+        <p:nvSpPr>
+          <p:cNvPr id="11" name="Flowchart: Magnetic Disk 10">
+            <a:extLst>
+              <a:ext uri="{FF2B5EF4-FFF2-40B4-BE49-F238E27FC236}">
+                <a16:creationId xmlns:a16="http://schemas.microsoft.com/office/drawing/2014/main" id="{11EB3092-5B18-BDEC-BA28-B334D98EF664}"/>
+              </a:ext>
+            </a:extLst>
+          </p:cNvPr>
+          <p:cNvSpPr/>
+          <p:nvPr/>
+        </p:nvSpPr>
+        <p:spPr>
+          <a:xfrm>
+            <a:off x="6477740" y="3116064"/>
+            <a:ext cx="967666" cy="727969"/>
+          </a:xfrm>
+          <a:prstGeom prst="flowChartMagneticDisk">
+            <a:avLst/>
+          </a:prstGeom>
+        </p:spPr>
+        <p:style>
+          <a:lnRef idx="2">
+            <a:schemeClr val="accent1">
+              <a:shade val="50000"/>
+            </a:schemeClr>
+          </a:lnRef>
+          <a:fillRef idx="1">
+            <a:schemeClr val="accent1"/>
+          </a:fillRef>
+          <a:effectRef idx="0">
+            <a:schemeClr val="accent1"/>
+          </a:effectRef>
+          <a:fontRef idx="minor">
+            <a:schemeClr val="lt1"/>
+          </a:fontRef>
+        </p:style>
+        <p:txBody>
+          <a:bodyPr rtlCol="0" anchor="ctr"/>
+          <a:lstStyle/>
+          <a:p>
+            <a:pPr algn="ctr"/>
+            <a:endParaRPr lang="en-GB"/>
+          </a:p>
+        </p:txBody>
+      </p:sp>
+      <p:sp>
+        <p:nvSpPr>
+          <p:cNvPr id="19" name="Rectangle: Rounded Corners 18">
+            <a:extLst>
+              <a:ext uri="{FF2B5EF4-FFF2-40B4-BE49-F238E27FC236}">
+                <a16:creationId xmlns:a16="http://schemas.microsoft.com/office/drawing/2014/main" id="{05FA14A3-991F-D439-3C73-8D477AD9A765}"/>
+              </a:ext>
+            </a:extLst>
+          </p:cNvPr>
+          <p:cNvSpPr/>
+          <p:nvPr/>
+        </p:nvSpPr>
+        <p:spPr>
+          <a:xfrm>
+            <a:off x="3409025" y="2831977"/>
+            <a:ext cx="4492101" cy="1216240"/>
+          </a:xfrm>
+          <a:prstGeom prst="roundRect">
+            <a:avLst/>
+          </a:prstGeom>
+          <a:noFill/>
+          <a:ln>
+            <a:prstDash val="lgDashDot"/>
+          </a:ln>
         </p:spPr>
         <p:style>
           <a:lnRef idx="2">

</xml_diff>